<commit_message>
added comments to P3, update checkpoint files, add gif in carvana
</commit_message>
<xml_diff>
--- a/P3/Depression vs Anxiety.pptx
+++ b/P3/Depression vs Anxiety.pptx
@@ -5,7 +5,7 @@
     <p:sldMasterId id="2147483648" r:id="rId1"/>
   </p:sldMasterIdLst>
   <p:notesMasterIdLst>
-    <p:notesMasterId r:id="rId19"/>
+    <p:notesMasterId r:id="rId23"/>
   </p:notesMasterIdLst>
   <p:sldIdLst>
     <p:sldId id="256" r:id="rId2"/>
@@ -15,16 +15,20 @@
     <p:sldId id="259" r:id="rId6"/>
     <p:sldId id="258" r:id="rId7"/>
     <p:sldId id="260" r:id="rId8"/>
-    <p:sldId id="263" r:id="rId9"/>
-    <p:sldId id="272" r:id="rId10"/>
-    <p:sldId id="261" r:id="rId11"/>
-    <p:sldId id="266" r:id="rId12"/>
-    <p:sldId id="267" r:id="rId13"/>
-    <p:sldId id="262" r:id="rId14"/>
-    <p:sldId id="264" r:id="rId15"/>
-    <p:sldId id="265" r:id="rId16"/>
-    <p:sldId id="268" r:id="rId17"/>
-    <p:sldId id="269" r:id="rId18"/>
+    <p:sldId id="273" r:id="rId9"/>
+    <p:sldId id="275" r:id="rId10"/>
+    <p:sldId id="263" r:id="rId11"/>
+    <p:sldId id="277" r:id="rId12"/>
+    <p:sldId id="272" r:id="rId13"/>
+    <p:sldId id="261" r:id="rId14"/>
+    <p:sldId id="266" r:id="rId15"/>
+    <p:sldId id="267" r:id="rId16"/>
+    <p:sldId id="262" r:id="rId17"/>
+    <p:sldId id="264" r:id="rId18"/>
+    <p:sldId id="265" r:id="rId19"/>
+    <p:sldId id="268" r:id="rId20"/>
+    <p:sldId id="269" r:id="rId21"/>
+    <p:sldId id="276" r:id="rId22"/>
   </p:sldIdLst>
   <p:sldSz cx="9144000" cy="6858000" type="screen4x3"/>
   <p:notesSz cx="6858000" cy="9144000"/>
@@ -209,7 +213,7 @@
             <a:fld id="{71595E9B-C1D5-4892-A520-BD319A1F0404}" type="datetimeFigureOut">
               <a:rPr lang="en-US" smtClean="0"/>
               <a:pPr/>
-              <a:t>12/7/2020</a:t>
+              <a:t>11/3/2021</a:t>
             </a:fld>
             <a:endParaRPr lang="en-US"/>
           </a:p>
@@ -561,6 +565,401 @@
 </p:notes>
 </file>
 
+<file path=ppt/notesSlides/notesSlide10.xml><?xml version="1.0" encoding="utf-8"?>
+<p:notes xmlns:a="http://schemas.openxmlformats.org/drawingml/2006/main" xmlns:r="http://schemas.openxmlformats.org/officeDocument/2006/relationships" xmlns:p="http://schemas.openxmlformats.org/presentationml/2006/main">
+  <p:cSld>
+    <p:spTree>
+      <p:nvGrpSpPr>
+        <p:cNvPr id="1" name=""/>
+        <p:cNvGrpSpPr/>
+        <p:nvPr/>
+      </p:nvGrpSpPr>
+      <p:grpSpPr>
+        <a:xfrm>
+          <a:off x="0" y="0"/>
+          <a:ext cx="0" cy="0"/>
+          <a:chOff x="0" y="0"/>
+          <a:chExt cx="0" cy="0"/>
+        </a:xfrm>
+      </p:grpSpPr>
+      <p:sp>
+        <p:nvSpPr>
+          <p:cNvPr id="2" name="Slide Image Placeholder 1"/>
+          <p:cNvSpPr>
+            <a:spLocks noGrp="1" noRot="1" noChangeAspect="1"/>
+          </p:cNvSpPr>
+          <p:nvPr>
+            <p:ph type="sldImg"/>
+          </p:nvPr>
+        </p:nvSpPr>
+        <p:spPr/>
+      </p:sp>
+      <p:sp>
+        <p:nvSpPr>
+          <p:cNvPr id="3" name="Notes Placeholder 2"/>
+          <p:cNvSpPr>
+            <a:spLocks noGrp="1"/>
+          </p:cNvSpPr>
+          <p:nvPr>
+            <p:ph type="body" idx="1"/>
+          </p:nvPr>
+        </p:nvSpPr>
+        <p:spPr/>
+        <p:txBody>
+          <a:bodyPr>
+            <a:normAutofit lnSpcReduction="10000"/>
+          </a:bodyPr>
+          <a:lstStyle/>
+          <a:p>
+            <a:r>
+              <a:rPr lang="en-US" sz="1200" b="1" i="0" kern="1200" dirty="0" smtClean="0">
+                <a:solidFill>
+                  <a:schemeClr val="tx1"/>
+                </a:solidFill>
+                <a:latin typeface="+mn-lt"/>
+                <a:ea typeface="+mn-ea"/>
+                <a:cs typeface="+mn-cs"/>
+              </a:rPr>
+              <a:t>Recommendations</a:t>
+            </a:r>
+            <a:endParaRPr lang="en-US" sz="1200" b="0" i="0" kern="1200" dirty="0" smtClean="0">
+              <a:solidFill>
+                <a:schemeClr val="tx1"/>
+              </a:solidFill>
+              <a:latin typeface="+mn-lt"/>
+              <a:ea typeface="+mn-ea"/>
+              <a:cs typeface="+mn-cs"/>
+            </a:endParaRPr>
+          </a:p>
+          <a:p>
+            <a:r>
+              <a:rPr lang="en-US" sz="1200" b="0" i="0" kern="1200" dirty="0" smtClean="0">
+                <a:solidFill>
+                  <a:schemeClr val="tx1"/>
+                </a:solidFill>
+                <a:latin typeface="+mn-lt"/>
+                <a:ea typeface="+mn-ea"/>
+                <a:cs typeface="+mn-cs"/>
+              </a:rPr>
+              <a:t>From the models built, </a:t>
+            </a:r>
+            <a:r>
+              <a:rPr lang="en-US" sz="1200" b="0" i="0" kern="1200" dirty="0" err="1" smtClean="0">
+                <a:solidFill>
+                  <a:schemeClr val="tx1"/>
+                </a:solidFill>
+                <a:latin typeface="+mn-lt"/>
+                <a:ea typeface="+mn-ea"/>
+                <a:cs typeface="+mn-cs"/>
+              </a:rPr>
+              <a:t>lr_cvec</a:t>
+            </a:r>
+            <a:r>
+              <a:rPr lang="en-US" sz="1200" b="0" i="0" kern="1200" dirty="0" smtClean="0">
+                <a:solidFill>
+                  <a:schemeClr val="tx1"/>
+                </a:solidFill>
+                <a:latin typeface="+mn-lt"/>
+                <a:ea typeface="+mn-ea"/>
+                <a:cs typeface="+mn-cs"/>
+              </a:rPr>
+              <a:t> has the highest accuracy. </a:t>
+            </a:r>
+          </a:p>
+          <a:p>
+            <a:endParaRPr lang="en-US" sz="1200" b="0" i="0" kern="1200" dirty="0" smtClean="0">
+              <a:solidFill>
+                <a:schemeClr val="tx1"/>
+              </a:solidFill>
+              <a:latin typeface="+mn-lt"/>
+              <a:ea typeface="+mn-ea"/>
+              <a:cs typeface="+mn-cs"/>
+            </a:endParaRPr>
+          </a:p>
+          <a:p>
+            <a:r>
+              <a:rPr lang="en-US" sz="1200" b="0" i="0" kern="1200" dirty="0" smtClean="0">
+                <a:solidFill>
+                  <a:schemeClr val="tx1"/>
+                </a:solidFill>
+                <a:latin typeface="+mn-lt"/>
+                <a:ea typeface="+mn-ea"/>
+                <a:cs typeface="+mn-cs"/>
+              </a:rPr>
+              <a:t>It can be utilized to identify posts from individuals showing signs or symptoms of depression or anxiety. If the text is about depression, </a:t>
+            </a:r>
+            <a:r>
+              <a:rPr lang="en-US" sz="1200" b="0" i="0" kern="1200" dirty="0" err="1" smtClean="0">
+                <a:solidFill>
+                  <a:schemeClr val="tx1"/>
+                </a:solidFill>
+                <a:latin typeface="+mn-lt"/>
+                <a:ea typeface="+mn-ea"/>
+                <a:cs typeface="+mn-cs"/>
+              </a:rPr>
+              <a:t>lr_cvec</a:t>
+            </a:r>
+            <a:r>
+              <a:rPr lang="en-US" sz="1200" b="0" i="0" kern="1200" dirty="0" smtClean="0">
+                <a:solidFill>
+                  <a:schemeClr val="tx1"/>
+                </a:solidFill>
+                <a:latin typeface="+mn-lt"/>
+                <a:ea typeface="+mn-ea"/>
+                <a:cs typeface="+mn-cs"/>
+              </a:rPr>
+              <a:t> can predict with 97.6% accuracy. Whereas, if the text is about anxiety, </a:t>
+            </a:r>
+            <a:r>
+              <a:rPr lang="en-US" sz="1200" b="0" i="0" kern="1200" dirty="0" err="1" smtClean="0">
+                <a:solidFill>
+                  <a:schemeClr val="tx1"/>
+                </a:solidFill>
+                <a:latin typeface="+mn-lt"/>
+                <a:ea typeface="+mn-ea"/>
+                <a:cs typeface="+mn-cs"/>
+              </a:rPr>
+              <a:t>lr_cvec</a:t>
+            </a:r>
+            <a:r>
+              <a:rPr lang="en-US" sz="1200" b="0" i="0" kern="1200" dirty="0" smtClean="0">
+                <a:solidFill>
+                  <a:schemeClr val="tx1"/>
+                </a:solidFill>
+                <a:latin typeface="+mn-lt"/>
+                <a:ea typeface="+mn-ea"/>
+                <a:cs typeface="+mn-cs"/>
+              </a:rPr>
+              <a:t> can predict with 93.1% accuracy. </a:t>
+            </a:r>
+          </a:p>
+          <a:p>
+            <a:endParaRPr lang="en-US" sz="1200" b="0" i="0" kern="1200" dirty="0" smtClean="0">
+              <a:solidFill>
+                <a:schemeClr val="tx1"/>
+              </a:solidFill>
+              <a:latin typeface="+mn-lt"/>
+              <a:ea typeface="+mn-ea"/>
+              <a:cs typeface="+mn-cs"/>
+            </a:endParaRPr>
+          </a:p>
+          <a:p>
+            <a:r>
+              <a:rPr lang="en-US" sz="1200" b="0" i="0" kern="1200" dirty="0" smtClean="0">
+                <a:solidFill>
+                  <a:schemeClr val="tx1"/>
+                </a:solidFill>
+                <a:latin typeface="+mn-lt"/>
+                <a:ea typeface="+mn-ea"/>
+                <a:cs typeface="+mn-cs"/>
+              </a:rPr>
+              <a:t>The notable words that have a great effect in classifying the text as depression are depression and depressed, which is quite obvious. </a:t>
+            </a:r>
+          </a:p>
+          <a:p>
+            <a:endParaRPr lang="en-US" sz="1200" b="0" i="0" kern="1200" dirty="0" smtClean="0">
+              <a:solidFill>
+                <a:schemeClr val="tx1"/>
+              </a:solidFill>
+              <a:latin typeface="+mn-lt"/>
+              <a:ea typeface="+mn-ea"/>
+              <a:cs typeface="+mn-cs"/>
+            </a:endParaRPr>
+          </a:p>
+          <a:p>
+            <a:r>
+              <a:rPr lang="en-US" sz="1200" b="0" i="0" kern="1200" dirty="0" smtClean="0">
+                <a:solidFill>
+                  <a:schemeClr val="tx1"/>
+                </a:solidFill>
+                <a:latin typeface="+mn-lt"/>
+                <a:ea typeface="+mn-ea"/>
+                <a:cs typeface="+mn-cs"/>
+              </a:rPr>
+              <a:t>As mentioned previously, using depression as the example, for every 1 increase in mention of depression in the text, the odds of the text about depression increases by 1.77 times, if all other factors are kept constant. </a:t>
+            </a:r>
+          </a:p>
+          <a:p>
+            <a:endParaRPr lang="en-US" sz="1200" b="0" i="0" kern="1200" dirty="0" smtClean="0">
+              <a:solidFill>
+                <a:schemeClr val="tx1"/>
+              </a:solidFill>
+              <a:latin typeface="+mn-lt"/>
+              <a:ea typeface="+mn-ea"/>
+              <a:cs typeface="+mn-cs"/>
+            </a:endParaRPr>
+          </a:p>
+          <a:p>
+            <a:r>
+              <a:rPr lang="en-US" sz="1200" b="0" i="0" kern="1200" dirty="0" smtClean="0">
+                <a:solidFill>
+                  <a:schemeClr val="tx1"/>
+                </a:solidFill>
+                <a:latin typeface="+mn-lt"/>
+                <a:ea typeface="+mn-ea"/>
+                <a:cs typeface="+mn-cs"/>
+              </a:rPr>
+              <a:t>Other prominent words are life, happy, kill, suicide, sad and suicidal. For life and happy, if the individual mentions them a lot in their posts, it may mean that they are not happy and are thinking about their lives frequently.</a:t>
+            </a:r>
+          </a:p>
+          <a:p>
+            <a:endParaRPr lang="en-US" sz="1200" b="0" i="0" kern="1200" dirty="0" smtClean="0">
+              <a:solidFill>
+                <a:schemeClr val="tx1"/>
+              </a:solidFill>
+              <a:latin typeface="+mn-lt"/>
+              <a:ea typeface="+mn-ea"/>
+              <a:cs typeface="+mn-cs"/>
+            </a:endParaRPr>
+          </a:p>
+          <a:p>
+            <a:r>
+              <a:rPr lang="en-US" sz="1200" b="0" i="0" kern="1200" dirty="0" smtClean="0">
+                <a:solidFill>
+                  <a:schemeClr val="tx1"/>
+                </a:solidFill>
+                <a:latin typeface="+mn-lt"/>
+                <a:ea typeface="+mn-ea"/>
+                <a:cs typeface="+mn-cs"/>
+              </a:rPr>
+              <a:t> Some interesting words like </a:t>
+            </a:r>
+            <a:r>
+              <a:rPr lang="en-US" sz="1200" b="0" i="0" kern="1200" dirty="0" err="1" smtClean="0">
+                <a:solidFill>
+                  <a:schemeClr val="tx1"/>
+                </a:solidFill>
+                <a:latin typeface="+mn-lt"/>
+                <a:ea typeface="+mn-ea"/>
+                <a:cs typeface="+mn-cs"/>
+              </a:rPr>
+              <a:t>mom,friends,family</a:t>
+            </a:r>
+            <a:r>
+              <a:rPr lang="en-US" sz="1200" b="0" i="0" kern="1200" dirty="0" smtClean="0">
+                <a:solidFill>
+                  <a:schemeClr val="tx1"/>
+                </a:solidFill>
+                <a:latin typeface="+mn-lt"/>
+                <a:ea typeface="+mn-ea"/>
+                <a:cs typeface="+mn-cs"/>
+              </a:rPr>
+              <a:t>, tired, hate can help to classify the post.</a:t>
+            </a:r>
+          </a:p>
+          <a:p>
+            <a:endParaRPr lang="en-US" sz="1200" b="1" i="0" kern="1200" dirty="0" smtClean="0">
+              <a:solidFill>
+                <a:schemeClr val="tx1"/>
+              </a:solidFill>
+              <a:latin typeface="+mn-lt"/>
+              <a:ea typeface="+mn-ea"/>
+              <a:cs typeface="+mn-cs"/>
+            </a:endParaRPr>
+          </a:p>
+          <a:p>
+            <a:endParaRPr lang="en-US" sz="1200" b="1" i="0" kern="1200" dirty="0" smtClean="0">
+              <a:solidFill>
+                <a:schemeClr val="tx1"/>
+              </a:solidFill>
+              <a:latin typeface="+mn-lt"/>
+              <a:ea typeface="+mn-ea"/>
+              <a:cs typeface="+mn-cs"/>
+            </a:endParaRPr>
+          </a:p>
+          <a:p>
+            <a:r>
+              <a:rPr lang="en-US" sz="1200" b="1" i="0" kern="1200" dirty="0" smtClean="0">
+                <a:solidFill>
+                  <a:schemeClr val="tx1"/>
+                </a:solidFill>
+                <a:latin typeface="+mn-lt"/>
+                <a:ea typeface="+mn-ea"/>
+                <a:cs typeface="+mn-cs"/>
+              </a:rPr>
+              <a:t>Conclusion</a:t>
+            </a:r>
+            <a:endParaRPr lang="en-US" sz="1200" b="0" i="0" kern="1200" dirty="0" smtClean="0">
+              <a:solidFill>
+                <a:schemeClr val="tx1"/>
+              </a:solidFill>
+              <a:latin typeface="+mn-lt"/>
+              <a:ea typeface="+mn-ea"/>
+              <a:cs typeface="+mn-cs"/>
+            </a:endParaRPr>
+          </a:p>
+          <a:p>
+            <a:r>
+              <a:rPr lang="en-US" sz="1200" b="0" i="0" kern="1200" dirty="0" smtClean="0">
+                <a:solidFill>
+                  <a:schemeClr val="tx1"/>
+                </a:solidFill>
+                <a:latin typeface="+mn-lt"/>
+                <a:ea typeface="+mn-ea"/>
+                <a:cs typeface="+mn-cs"/>
+              </a:rPr>
+              <a:t>Stakeholders may wish to use the model to see if it can help identify symptoms of depression or anxiety from depression or anxiety sub-</a:t>
+            </a:r>
+            <a:r>
+              <a:rPr lang="en-US" sz="1200" b="0" i="0" kern="1200" dirty="0" err="1" smtClean="0">
+                <a:solidFill>
+                  <a:schemeClr val="tx1"/>
+                </a:solidFill>
+                <a:latin typeface="+mn-lt"/>
+                <a:ea typeface="+mn-ea"/>
+                <a:cs typeface="+mn-cs"/>
+              </a:rPr>
+              <a:t>reddit</a:t>
+            </a:r>
+            <a:r>
+              <a:rPr lang="en-US" sz="1200" b="0" i="0" kern="1200" dirty="0" smtClean="0">
+                <a:solidFill>
+                  <a:schemeClr val="tx1"/>
+                </a:solidFill>
+                <a:latin typeface="+mn-lt"/>
+                <a:ea typeface="+mn-ea"/>
+                <a:cs typeface="+mn-cs"/>
+              </a:rPr>
+              <a:t> posts. By extrapolating to their current patients, it may help to identify if their patients are leaning towards depression or anxiety.</a:t>
+            </a:r>
+          </a:p>
+          <a:p>
+            <a:endParaRPr lang="en-US" dirty="0"/>
+          </a:p>
+        </p:txBody>
+      </p:sp>
+      <p:sp>
+        <p:nvSpPr>
+          <p:cNvPr id="4" name="Slide Number Placeholder 3"/>
+          <p:cNvSpPr>
+            <a:spLocks noGrp="1"/>
+          </p:cNvSpPr>
+          <p:nvPr>
+            <p:ph type="sldNum" sz="quarter" idx="10"/>
+          </p:nvPr>
+        </p:nvSpPr>
+        <p:spPr/>
+        <p:txBody>
+          <a:bodyPr/>
+          <a:lstStyle/>
+          <a:p>
+            <a:fld id="{F19DAB69-AC5E-4C5E-AA53-D38631A12F00}" type="slidenum">
+              <a:rPr lang="en-US" smtClean="0"/>
+              <a:pPr/>
+              <a:t>20</a:t>
+            </a:fld>
+            <a:endParaRPr lang="en-US"/>
+          </a:p>
+        </p:txBody>
+      </p:sp>
+    </p:spTree>
+  </p:cSld>
+  <p:clrMapOvr>
+    <a:masterClrMapping/>
+  </p:clrMapOvr>
+</p:notes>
+</file>
+
 <file path=ppt/notesSlides/notesSlide2.xml><?xml version="1.0" encoding="utf-8"?>
 <p:notes xmlns:a="http://schemas.openxmlformats.org/drawingml/2006/main" xmlns:r="http://schemas.openxmlformats.org/officeDocument/2006/relationships" xmlns:p="http://schemas.openxmlformats.org/presentationml/2006/main">
   <p:cSld>
@@ -872,18 +1271,6 @@
           </a:bodyPr>
           <a:lstStyle/>
           <a:p>
-            <a:r>
-              <a:rPr lang="en-US" dirty="0" smtClean="0"/>
-              <a:t>Model with </a:t>
-            </a:r>
-            <a:r>
-              <a:rPr lang="en-US" dirty="0" err="1" smtClean="0"/>
-              <a:t>nb_cvec</a:t>
-            </a:r>
-            <a:r>
-              <a:rPr lang="en-US" dirty="0" smtClean="0"/>
-              <a:t> after cleaning, accuracy</a:t>
-            </a:r>
             <a:endParaRPr lang="en-US" dirty="0"/>
           </a:p>
         </p:txBody>
@@ -906,7 +1293,7 @@
             <a:fld id="{F19DAB69-AC5E-4C5E-AA53-D38631A12F00}" type="slidenum">
               <a:rPr lang="en-US" smtClean="0"/>
               <a:pPr/>
-              <a:t>7</a:t>
+              <a:t>6</a:t>
             </a:fld>
             <a:endParaRPr lang="en-US"/>
           </a:p>
@@ -968,7 +1355,15 @@
           <a:p>
             <a:r>
               <a:rPr lang="en-US" dirty="0" smtClean="0"/>
-              <a:t>50 most common words in Anxiety</a:t>
+              <a:t>Model with </a:t>
+            </a:r>
+            <a:r>
+              <a:rPr lang="en-US" dirty="0" err="1" smtClean="0"/>
+              <a:t>nb_cvec</a:t>
+            </a:r>
+            <a:r>
+              <a:rPr lang="en-US" dirty="0" smtClean="0"/>
+              <a:t> after cleaning, accuracy</a:t>
             </a:r>
             <a:endParaRPr lang="en-US" dirty="0"/>
           </a:p>
@@ -992,7 +1387,7 @@
             <a:fld id="{F19DAB69-AC5E-4C5E-AA53-D38631A12F00}" type="slidenum">
               <a:rPr lang="en-US" smtClean="0"/>
               <a:pPr/>
-              <a:t>11</a:t>
+              <a:t>7</a:t>
             </a:fld>
             <a:endParaRPr lang="en-US"/>
           </a:p>
@@ -1054,7 +1449,7 @@
           <a:p>
             <a:r>
               <a:rPr lang="en-US" dirty="0" smtClean="0"/>
-              <a:t>50 most common words in Depression</a:t>
+              <a:t>50 most common words in Anxiety</a:t>
             </a:r>
             <a:endParaRPr lang="en-US" dirty="0"/>
           </a:p>
@@ -1078,7 +1473,7 @@
             <a:fld id="{F19DAB69-AC5E-4C5E-AA53-D38631A12F00}" type="slidenum">
               <a:rPr lang="en-US" smtClean="0"/>
               <a:pPr/>
-              <a:t>12</a:t>
+              <a:t>14</a:t>
             </a:fld>
             <a:endParaRPr lang="en-US"/>
           </a:p>
@@ -1140,57 +1535,7 @@
           <a:p>
             <a:r>
               <a:rPr lang="en-US" dirty="0" smtClean="0"/>
-              <a:t>Unfortunately</a:t>
-            </a:r>
-            <a:r>
-              <a:rPr lang="en-US" baseline="0" dirty="0" smtClean="0"/>
-              <a:t> the score did not improve, accuracy maintained at 82%. Used back the original </a:t>
-            </a:r>
-            <a:r>
-              <a:rPr lang="en-US" baseline="0" dirty="0" err="1" smtClean="0"/>
-              <a:t>cleaned_text</a:t>
-            </a:r>
-            <a:endParaRPr lang="en-US" baseline="0" dirty="0" smtClean="0"/>
-          </a:p>
-          <a:p>
-            <a:endParaRPr lang="en-US" baseline="0" dirty="0" smtClean="0"/>
-          </a:p>
-          <a:p>
-            <a:r>
-              <a:rPr lang="en-US" baseline="0" dirty="0" smtClean="0"/>
-              <a:t>A total of 4 models were built, </a:t>
-            </a:r>
-            <a:r>
-              <a:rPr lang="en-US" baseline="0" dirty="0" err="1" smtClean="0"/>
-              <a:t>nb_cvec</a:t>
-            </a:r>
-            <a:r>
-              <a:rPr lang="en-US" baseline="0" dirty="0" smtClean="0"/>
-              <a:t>, </a:t>
-            </a:r>
-            <a:r>
-              <a:rPr lang="en-US" baseline="0" dirty="0" err="1" smtClean="0"/>
-              <a:t>nb_tvec</a:t>
-            </a:r>
-            <a:r>
-              <a:rPr lang="en-US" baseline="0" dirty="0" smtClean="0"/>
-              <a:t>, </a:t>
-            </a:r>
-            <a:r>
-              <a:rPr lang="en-US" baseline="0" dirty="0" err="1" smtClean="0"/>
-              <a:t>lr_cvec</a:t>
-            </a:r>
-            <a:r>
-              <a:rPr lang="en-US" baseline="0" dirty="0" smtClean="0"/>
-              <a:t>, </a:t>
-            </a:r>
-            <a:r>
-              <a:rPr lang="en-US" baseline="0" dirty="0" err="1" smtClean="0"/>
-              <a:t>lr_tvec</a:t>
-            </a:r>
-            <a:r>
-              <a:rPr lang="en-US" baseline="0" dirty="0" smtClean="0"/>
-              <a:t>.</a:t>
+              <a:t>50 most common words in Depression</a:t>
             </a:r>
             <a:endParaRPr lang="en-US" dirty="0"/>
           </a:p>
@@ -1214,7 +1559,7 @@
             <a:fld id="{F19DAB69-AC5E-4C5E-AA53-D38631A12F00}" type="slidenum">
               <a:rPr lang="en-US" smtClean="0"/>
               <a:pPr/>
-              <a:t>13</a:t>
+              <a:t>15</a:t>
             </a:fld>
             <a:endParaRPr lang="en-US"/>
           </a:p>
@@ -1275,45 +1620,58 @@
           <a:lstStyle/>
           <a:p>
             <a:r>
-              <a:rPr lang="en-US" sz="1200" b="0" i="0" kern="1200" dirty="0" smtClean="0">
-                <a:solidFill>
-                  <a:schemeClr val="tx1"/>
-                </a:solidFill>
-                <a:latin typeface="+mn-lt"/>
-                <a:ea typeface="+mn-ea"/>
-                <a:cs typeface="+mn-cs"/>
-              </a:rPr>
-              <a:t>using </a:t>
-            </a:r>
-            <a:r>
               <a:rPr lang="en-US" dirty="0" smtClean="0"/>
-              <a:t>depression</a:t>
-            </a:r>
-            <a:r>
-              <a:rPr lang="en-US" sz="1200" b="0" i="0" kern="1200" dirty="0" smtClean="0">
-                <a:solidFill>
-                  <a:schemeClr val="tx1"/>
-                </a:solidFill>
-                <a:latin typeface="+mn-lt"/>
-                <a:ea typeface="+mn-ea"/>
-                <a:cs typeface="+mn-cs"/>
-              </a:rPr>
-              <a:t> as the example, for every 1 increase in mention of </a:t>
-            </a:r>
-            <a:r>
-              <a:rPr lang="en-US" dirty="0" smtClean="0"/>
-              <a:t>depression</a:t>
-            </a:r>
-            <a:r>
-              <a:rPr lang="en-US" sz="1200" b="0" i="0" kern="1200" dirty="0" smtClean="0">
-                <a:solidFill>
-                  <a:schemeClr val="tx1"/>
-                </a:solidFill>
-                <a:latin typeface="+mn-lt"/>
-                <a:ea typeface="+mn-ea"/>
-                <a:cs typeface="+mn-cs"/>
-              </a:rPr>
-              <a:t> in the text, the odds of the text about depression increases by 1.77 times, if all other factors are kept constant</a:t>
+              <a:t>Unfortunately</a:t>
+            </a:r>
+            <a:r>
+              <a:rPr lang="en-US" baseline="0" dirty="0" smtClean="0"/>
+              <a:t> the score did not improve, accuracy maintained at 82%. Used back the original </a:t>
+            </a:r>
+            <a:r>
+              <a:rPr lang="en-US" baseline="0" dirty="0" err="1" smtClean="0"/>
+              <a:t>cleaned_text</a:t>
+            </a:r>
+            <a:endParaRPr lang="en-US" baseline="0" dirty="0" smtClean="0"/>
+          </a:p>
+          <a:p>
+            <a:endParaRPr lang="en-US" baseline="0" dirty="0" smtClean="0"/>
+          </a:p>
+          <a:p>
+            <a:r>
+              <a:rPr lang="en-US" baseline="0" dirty="0" smtClean="0"/>
+              <a:t>A total of 4 models were built, </a:t>
+            </a:r>
+            <a:r>
+              <a:rPr lang="en-US" baseline="0" dirty="0" err="1" smtClean="0"/>
+              <a:t>nb_cvec</a:t>
+            </a:r>
+            <a:r>
+              <a:rPr lang="en-US" baseline="0" dirty="0" smtClean="0"/>
+              <a:t>, </a:t>
+            </a:r>
+            <a:r>
+              <a:rPr lang="en-US" baseline="0" dirty="0" err="1" smtClean="0"/>
+              <a:t>nb_tvec</a:t>
+            </a:r>
+            <a:r>
+              <a:rPr lang="en-US" baseline="0" dirty="0" smtClean="0"/>
+              <a:t>, </a:t>
+            </a:r>
+            <a:r>
+              <a:rPr lang="en-US" baseline="0" dirty="0" err="1" smtClean="0"/>
+              <a:t>lr_cvec</a:t>
+            </a:r>
+            <a:r>
+              <a:rPr lang="en-US" baseline="0" dirty="0" smtClean="0"/>
+              <a:t>, </a:t>
+            </a:r>
+            <a:r>
+              <a:rPr lang="en-US" baseline="0" dirty="0" err="1" smtClean="0"/>
+              <a:t>lr_tvec</a:t>
+            </a:r>
+            <a:r>
+              <a:rPr lang="en-US" baseline="0" dirty="0" smtClean="0"/>
+              <a:t>.</a:t>
             </a:r>
             <a:endParaRPr lang="en-US" dirty="0"/>
           </a:p>
@@ -1337,7 +1695,7 @@
             <a:fld id="{F19DAB69-AC5E-4C5E-AA53-D38631A12F00}" type="slidenum">
               <a:rPr lang="en-US" smtClean="0"/>
               <a:pPr/>
-              <a:t>15</a:t>
+              <a:t>16</a:t>
             </a:fld>
             <a:endParaRPr lang="en-US"/>
           </a:p>
@@ -1393,30 +1751,9 @@
         <p:spPr/>
         <p:txBody>
           <a:bodyPr>
-            <a:normAutofit lnSpcReduction="10000"/>
+            <a:normAutofit/>
           </a:bodyPr>
           <a:lstStyle/>
-          <a:p>
-            <a:r>
-              <a:rPr lang="en-US" sz="1200" b="1" i="0" kern="1200" dirty="0" smtClean="0">
-                <a:solidFill>
-                  <a:schemeClr val="tx1"/>
-                </a:solidFill>
-                <a:latin typeface="+mn-lt"/>
-                <a:ea typeface="+mn-ea"/>
-                <a:cs typeface="+mn-cs"/>
-              </a:rPr>
-              <a:t>Recommendations</a:t>
-            </a:r>
-            <a:endParaRPr lang="en-US" sz="1200" b="0" i="0" kern="1200" dirty="0" smtClean="0">
-              <a:solidFill>
-                <a:schemeClr val="tx1"/>
-              </a:solidFill>
-              <a:latin typeface="+mn-lt"/>
-              <a:ea typeface="+mn-ea"/>
-              <a:cs typeface="+mn-cs"/>
-            </a:endParaRPr>
-          </a:p>
           <a:p>
             <a:r>
               <a:rPr lang="en-US" sz="1200" b="0" i="0" kern="1200" dirty="0" smtClean="0">
@@ -1427,18 +1764,11 @@
                 <a:ea typeface="+mn-ea"/>
                 <a:cs typeface="+mn-cs"/>
               </a:rPr>
-              <a:t>From the models built, </a:t>
-            </a:r>
-            <a:r>
-              <a:rPr lang="en-US" sz="1200" b="0" i="0" kern="1200" dirty="0" err="1" smtClean="0">
-                <a:solidFill>
-                  <a:schemeClr val="tx1"/>
-                </a:solidFill>
-                <a:latin typeface="+mn-lt"/>
-                <a:ea typeface="+mn-ea"/>
-                <a:cs typeface="+mn-cs"/>
-              </a:rPr>
-              <a:t>lr_cvec</a:t>
+              <a:t>- (wrong) using </a:t>
+            </a:r>
+            <a:r>
+              <a:rPr lang="en-US" dirty="0" smtClean="0"/>
+              <a:t>depression</a:t>
             </a:r>
             <a:r>
               <a:rPr lang="en-US" sz="1200" b="0" i="0" kern="1200" dirty="0" smtClean="0">
@@ -1449,20 +1779,12 @@
                 <a:ea typeface="+mn-ea"/>
                 <a:cs typeface="+mn-cs"/>
               </a:rPr>
-              <a:t> has the highest accuracy. </a:t>
-            </a:r>
-          </a:p>
-          <a:p>
-            <a:endParaRPr lang="en-US" sz="1200" b="0" i="0" kern="1200" dirty="0" smtClean="0">
-              <a:solidFill>
-                <a:schemeClr val="tx1"/>
-              </a:solidFill>
-              <a:latin typeface="+mn-lt"/>
-              <a:ea typeface="+mn-ea"/>
-              <a:cs typeface="+mn-cs"/>
-            </a:endParaRPr>
-          </a:p>
-          <a:p>
+              <a:t> as the example, for every 1 increase in mention of </a:t>
+            </a:r>
+            <a:r>
+              <a:rPr lang="en-US" dirty="0" smtClean="0"/>
+              <a:t>depression</a:t>
+            </a:r>
             <a:r>
               <a:rPr lang="en-US" sz="1200" b="0" i="0" kern="1200" dirty="0" smtClean="0">
                 <a:solidFill>
@@ -1472,10 +1794,16 @@
                 <a:ea typeface="+mn-ea"/>
                 <a:cs typeface="+mn-cs"/>
               </a:rPr>
-              <a:t>It can be utilized to identify posts from individuals showing signs or symptoms of depression or anxiety. If the text is about depression, </a:t>
-            </a:r>
-            <a:r>
-              <a:rPr lang="en-US" sz="1200" b="0" i="0" kern="1200" dirty="0" err="1" smtClean="0">
+              <a:t> in the text, the odds of the text about depression increases by 1.77 times, if all other factors are kept constant</a:t>
+            </a:r>
+          </a:p>
+          <a:p>
+            <a:pPr>
+              <a:buFontTx/>
+              <a:buChar char="-"/>
+            </a:pPr>
+            <a:r>
+              <a:rPr lang="en-SG" sz="1200" b="0" i="0" kern="1200" dirty="0" smtClean="0">
                 <a:solidFill>
                   <a:schemeClr val="tx1"/>
                 </a:solidFill>
@@ -1483,7 +1811,7 @@
                 <a:ea typeface="+mn-ea"/>
                 <a:cs typeface="+mn-cs"/>
               </a:rPr>
-              <a:t>lr_cvec</a:t>
+              <a:t>(correct) </a:t>
             </a:r>
             <a:r>
               <a:rPr lang="en-US" sz="1200" b="0" i="0" kern="1200" dirty="0" smtClean="0">
@@ -1494,18 +1822,11 @@
                 <a:ea typeface="+mn-ea"/>
                 <a:cs typeface="+mn-cs"/>
               </a:rPr>
-              <a:t> can predict with 97.6% accuracy. Whereas, if the text is about anxiety, </a:t>
-            </a:r>
-            <a:r>
-              <a:rPr lang="en-US" sz="1200" b="0" i="0" kern="1200" dirty="0" err="1" smtClean="0">
-                <a:solidFill>
-                  <a:schemeClr val="tx1"/>
-                </a:solidFill>
-                <a:latin typeface="+mn-lt"/>
-                <a:ea typeface="+mn-ea"/>
-                <a:cs typeface="+mn-cs"/>
-              </a:rPr>
-              <a:t>lr_cvec</a:t>
+              <a:t>using </a:t>
+            </a:r>
+            <a:r>
+              <a:rPr lang="en-US" dirty="0" smtClean="0"/>
+              <a:t>depression</a:t>
             </a:r>
             <a:r>
               <a:rPr lang="en-US" sz="1200" b="0" i="0" kern="1200" dirty="0" smtClean="0">
@@ -1516,20 +1837,12 @@
                 <a:ea typeface="+mn-ea"/>
                 <a:cs typeface="+mn-cs"/>
               </a:rPr>
-              <a:t> can predict with 93.1% accuracy. </a:t>
-            </a:r>
-          </a:p>
-          <a:p>
-            <a:endParaRPr lang="en-US" sz="1200" b="0" i="0" kern="1200" dirty="0" smtClean="0">
-              <a:solidFill>
-                <a:schemeClr val="tx1"/>
-              </a:solidFill>
-              <a:latin typeface="+mn-lt"/>
-              <a:ea typeface="+mn-ea"/>
-              <a:cs typeface="+mn-cs"/>
-            </a:endParaRPr>
-          </a:p>
-          <a:p>
+              <a:t> as the example, for every 1 increase in mention of </a:t>
+            </a:r>
+            <a:r>
+              <a:rPr lang="en-US" dirty="0" smtClean="0"/>
+              <a:t>depression</a:t>
+            </a:r>
             <a:r>
               <a:rPr lang="en-US" sz="1200" b="0" i="0" kern="1200" dirty="0" smtClean="0">
                 <a:solidFill>
@@ -1539,20 +1852,14 @@
                 <a:ea typeface="+mn-ea"/>
                 <a:cs typeface="+mn-cs"/>
               </a:rPr>
-              <a:t>The notable words that have a great effect in classifying the text as depression are depression and depressed, which is quite obvious. </a:t>
-            </a:r>
-          </a:p>
-          <a:p>
-            <a:endParaRPr lang="en-US" sz="1200" b="0" i="0" kern="1200" dirty="0" smtClean="0">
-              <a:solidFill>
-                <a:schemeClr val="tx1"/>
-              </a:solidFill>
-              <a:latin typeface="+mn-lt"/>
-              <a:ea typeface="+mn-ea"/>
-              <a:cs typeface="+mn-cs"/>
-            </a:endParaRPr>
-          </a:p>
-          <a:p>
+              <a:t> in the text, the odds of the text about depression increases by e^1.77(~5.87 times), since model predicts on depression</a:t>
+            </a:r>
+          </a:p>
+          <a:p>
+            <a:pPr>
+              <a:buFontTx/>
+              <a:buNone/>
+            </a:pPr>
             <a:r>
               <a:rPr lang="en-US" sz="1200" b="0" i="0" kern="1200" dirty="0" smtClean="0">
                 <a:solidFill>
@@ -1562,11 +1869,9 @@
                 <a:ea typeface="+mn-ea"/>
                 <a:cs typeface="+mn-cs"/>
               </a:rPr>
-              <a:t>As mentioned previously, using depression as the example, for every 1 increase in mention of depression in the text, the odds of the text about depression increases by 1.77 times, if all other factors are kept constant. </a:t>
-            </a:r>
-          </a:p>
-          <a:p>
-            <a:endParaRPr lang="en-US" sz="1200" b="0" i="0" kern="1200" dirty="0" smtClean="0">
+              <a:t> if all other factors are kept constant</a:t>
+            </a:r>
+            <a:endParaRPr lang="en-SG" sz="1200" b="0" i="0" kern="1200" dirty="0" smtClean="0">
               <a:solidFill>
                 <a:schemeClr val="tx1"/>
               </a:solidFill>
@@ -1576,140 +1881,6 @@
             </a:endParaRPr>
           </a:p>
           <a:p>
-            <a:r>
-              <a:rPr lang="en-US" sz="1200" b="0" i="0" kern="1200" dirty="0" smtClean="0">
-                <a:solidFill>
-                  <a:schemeClr val="tx1"/>
-                </a:solidFill>
-                <a:latin typeface="+mn-lt"/>
-                <a:ea typeface="+mn-ea"/>
-                <a:cs typeface="+mn-cs"/>
-              </a:rPr>
-              <a:t>Other prominent words are life, happy, kill, suicide, sad and suicidal. For life and happy, if the individual mentions them a lot in their posts, it may mean that they are not happy and are thinking about their lives frequently.</a:t>
-            </a:r>
-          </a:p>
-          <a:p>
-            <a:endParaRPr lang="en-US" sz="1200" b="0" i="0" kern="1200" dirty="0" smtClean="0">
-              <a:solidFill>
-                <a:schemeClr val="tx1"/>
-              </a:solidFill>
-              <a:latin typeface="+mn-lt"/>
-              <a:ea typeface="+mn-ea"/>
-              <a:cs typeface="+mn-cs"/>
-            </a:endParaRPr>
-          </a:p>
-          <a:p>
-            <a:r>
-              <a:rPr lang="en-US" sz="1200" b="0" i="0" kern="1200" dirty="0" smtClean="0">
-                <a:solidFill>
-                  <a:schemeClr val="tx1"/>
-                </a:solidFill>
-                <a:latin typeface="+mn-lt"/>
-                <a:ea typeface="+mn-ea"/>
-                <a:cs typeface="+mn-cs"/>
-              </a:rPr>
-              <a:t> Some interesting words like </a:t>
-            </a:r>
-            <a:r>
-              <a:rPr lang="en-US" sz="1200" b="0" i="0" kern="1200" dirty="0" err="1" smtClean="0">
-                <a:solidFill>
-                  <a:schemeClr val="tx1"/>
-                </a:solidFill>
-                <a:latin typeface="+mn-lt"/>
-                <a:ea typeface="+mn-ea"/>
-                <a:cs typeface="+mn-cs"/>
-              </a:rPr>
-              <a:t>mom,friends,family</a:t>
-            </a:r>
-            <a:r>
-              <a:rPr lang="en-US" sz="1200" b="0" i="0" kern="1200" dirty="0" smtClean="0">
-                <a:solidFill>
-                  <a:schemeClr val="tx1"/>
-                </a:solidFill>
-                <a:latin typeface="+mn-lt"/>
-                <a:ea typeface="+mn-ea"/>
-                <a:cs typeface="+mn-cs"/>
-              </a:rPr>
-              <a:t>, tired, hate can help to classify the post.</a:t>
-            </a:r>
-          </a:p>
-          <a:p>
-            <a:endParaRPr lang="en-US" sz="1200" b="1" i="0" kern="1200" dirty="0" smtClean="0">
-              <a:solidFill>
-                <a:schemeClr val="tx1"/>
-              </a:solidFill>
-              <a:latin typeface="+mn-lt"/>
-              <a:ea typeface="+mn-ea"/>
-              <a:cs typeface="+mn-cs"/>
-            </a:endParaRPr>
-          </a:p>
-          <a:p>
-            <a:endParaRPr lang="en-US" sz="1200" b="1" i="0" kern="1200" dirty="0" smtClean="0">
-              <a:solidFill>
-                <a:schemeClr val="tx1"/>
-              </a:solidFill>
-              <a:latin typeface="+mn-lt"/>
-              <a:ea typeface="+mn-ea"/>
-              <a:cs typeface="+mn-cs"/>
-            </a:endParaRPr>
-          </a:p>
-          <a:p>
-            <a:r>
-              <a:rPr lang="en-US" sz="1200" b="1" i="0" kern="1200" dirty="0" smtClean="0">
-                <a:solidFill>
-                  <a:schemeClr val="tx1"/>
-                </a:solidFill>
-                <a:latin typeface="+mn-lt"/>
-                <a:ea typeface="+mn-ea"/>
-                <a:cs typeface="+mn-cs"/>
-              </a:rPr>
-              <a:t>Conclusion</a:t>
-            </a:r>
-            <a:endParaRPr lang="en-US" sz="1200" b="0" i="0" kern="1200" dirty="0" smtClean="0">
-              <a:solidFill>
-                <a:schemeClr val="tx1"/>
-              </a:solidFill>
-              <a:latin typeface="+mn-lt"/>
-              <a:ea typeface="+mn-ea"/>
-              <a:cs typeface="+mn-cs"/>
-            </a:endParaRPr>
-          </a:p>
-          <a:p>
-            <a:r>
-              <a:rPr lang="en-US" sz="1200" b="0" i="0" kern="1200" dirty="0" smtClean="0">
-                <a:solidFill>
-                  <a:schemeClr val="tx1"/>
-                </a:solidFill>
-                <a:latin typeface="+mn-lt"/>
-                <a:ea typeface="+mn-ea"/>
-                <a:cs typeface="+mn-cs"/>
-              </a:rPr>
-              <a:t>Stakeholders may wish to use the model to see if it can help identify symptoms of depression or anxiety from depression or anxiety sub-</a:t>
-            </a:r>
-            <a:r>
-              <a:rPr lang="en-US" sz="1200" b="0" i="0" kern="1200" dirty="0" err="1" smtClean="0">
-                <a:solidFill>
-                  <a:schemeClr val="tx1"/>
-                </a:solidFill>
-                <a:latin typeface="+mn-lt"/>
-                <a:ea typeface="+mn-ea"/>
-                <a:cs typeface="+mn-cs"/>
-              </a:rPr>
-              <a:t>reddit</a:t>
-            </a:r>
-            <a:r>
-              <a:rPr lang="en-US" sz="1200" b="0" i="0" kern="1200" dirty="0" smtClean="0">
-                <a:solidFill>
-                  <a:schemeClr val="tx1"/>
-                </a:solidFill>
-                <a:latin typeface="+mn-lt"/>
-                <a:ea typeface="+mn-ea"/>
-                <a:cs typeface="+mn-cs"/>
-              </a:rPr>
-              <a:t> posts. By extrapolating to their current patients, it may help to identify if their patients are leaning towards depression or anxiety.</a:t>
-            </a:r>
-          </a:p>
-          <a:p>
             <a:endParaRPr lang="en-US" dirty="0"/>
           </a:p>
         </p:txBody>
@@ -1732,7 +1903,7 @@
             <a:fld id="{F19DAB69-AC5E-4C5E-AA53-D38631A12F00}" type="slidenum">
               <a:rPr lang="en-US" smtClean="0"/>
               <a:pPr/>
-              <a:t>17</a:t>
+              <a:t>18</a:t>
             </a:fld>
             <a:endParaRPr lang="en-US"/>
           </a:p>
@@ -1928,7 +2099,7 @@
             <a:fld id="{953DF727-6851-43FD-BFD0-1B4C5C2D423A}" type="datetimeFigureOut">
               <a:rPr lang="en-US" smtClean="0"/>
               <a:pPr/>
-              <a:t>12/7/2020</a:t>
+              <a:t>11/3/2021</a:t>
             </a:fld>
             <a:endParaRPr lang="en-US"/>
           </a:p>
@@ -2095,7 +2266,7 @@
             <a:fld id="{953DF727-6851-43FD-BFD0-1B4C5C2D423A}" type="datetimeFigureOut">
               <a:rPr lang="en-US" smtClean="0"/>
               <a:pPr/>
-              <a:t>12/7/2020</a:t>
+              <a:t>11/3/2021</a:t>
             </a:fld>
             <a:endParaRPr lang="en-US"/>
           </a:p>
@@ -2272,7 +2443,7 @@
             <a:fld id="{953DF727-6851-43FD-BFD0-1B4C5C2D423A}" type="datetimeFigureOut">
               <a:rPr lang="en-US" smtClean="0"/>
               <a:pPr/>
-              <a:t>12/7/2020</a:t>
+              <a:t>11/3/2021</a:t>
             </a:fld>
             <a:endParaRPr lang="en-US"/>
           </a:p>
@@ -2439,7 +2610,7 @@
             <a:fld id="{953DF727-6851-43FD-BFD0-1B4C5C2D423A}" type="datetimeFigureOut">
               <a:rPr lang="en-US" smtClean="0"/>
               <a:pPr/>
-              <a:t>12/7/2020</a:t>
+              <a:t>11/3/2021</a:t>
             </a:fld>
             <a:endParaRPr lang="en-US"/>
           </a:p>
@@ -2682,7 +2853,7 @@
             <a:fld id="{953DF727-6851-43FD-BFD0-1B4C5C2D423A}" type="datetimeFigureOut">
               <a:rPr lang="en-US" smtClean="0"/>
               <a:pPr/>
-              <a:t>12/7/2020</a:t>
+              <a:t>11/3/2021</a:t>
             </a:fld>
             <a:endParaRPr lang="en-US"/>
           </a:p>
@@ -2967,7 +3138,7 @@
             <a:fld id="{953DF727-6851-43FD-BFD0-1B4C5C2D423A}" type="datetimeFigureOut">
               <a:rPr lang="en-US" smtClean="0"/>
               <a:pPr/>
-              <a:t>12/7/2020</a:t>
+              <a:t>11/3/2021</a:t>
             </a:fld>
             <a:endParaRPr lang="en-US"/>
           </a:p>
@@ -3386,7 +3557,7 @@
             <a:fld id="{953DF727-6851-43FD-BFD0-1B4C5C2D423A}" type="datetimeFigureOut">
               <a:rPr lang="en-US" smtClean="0"/>
               <a:pPr/>
-              <a:t>12/7/2020</a:t>
+              <a:t>11/3/2021</a:t>
             </a:fld>
             <a:endParaRPr lang="en-US"/>
           </a:p>
@@ -3501,7 +3672,7 @@
             <a:fld id="{953DF727-6851-43FD-BFD0-1B4C5C2D423A}" type="datetimeFigureOut">
               <a:rPr lang="en-US" smtClean="0"/>
               <a:pPr/>
-              <a:t>12/7/2020</a:t>
+              <a:t>11/3/2021</a:t>
             </a:fld>
             <a:endParaRPr lang="en-US"/>
           </a:p>
@@ -3593,7 +3764,7 @@
             <a:fld id="{953DF727-6851-43FD-BFD0-1B4C5C2D423A}" type="datetimeFigureOut">
               <a:rPr lang="en-US" smtClean="0"/>
               <a:pPr/>
-              <a:t>12/7/2020</a:t>
+              <a:t>11/3/2021</a:t>
             </a:fld>
             <a:endParaRPr lang="en-US"/>
           </a:p>
@@ -3867,7 +4038,7 @@
             <a:fld id="{953DF727-6851-43FD-BFD0-1B4C5C2D423A}" type="datetimeFigureOut">
               <a:rPr lang="en-US" smtClean="0"/>
               <a:pPr/>
-              <a:t>12/7/2020</a:t>
+              <a:t>11/3/2021</a:t>
             </a:fld>
             <a:endParaRPr lang="en-US"/>
           </a:p>
@@ -4117,7 +4288,7 @@
             <a:fld id="{953DF727-6851-43FD-BFD0-1B4C5C2D423A}" type="datetimeFigureOut">
               <a:rPr lang="en-US" smtClean="0"/>
               <a:pPr/>
-              <a:t>12/7/2020</a:t>
+              <a:t>11/3/2021</a:t>
             </a:fld>
             <a:endParaRPr lang="en-US"/>
           </a:p>
@@ -4327,7 +4498,7 @@
             <a:fld id="{953DF727-6851-43FD-BFD0-1B4C5C2D423A}" type="datetimeFigureOut">
               <a:rPr lang="en-US" smtClean="0"/>
               <a:pPr/>
-              <a:t>12/7/2020</a:t>
+              <a:t>11/3/2021</a:t>
             </a:fld>
             <a:endParaRPr lang="en-US"/>
           </a:p>
@@ -4821,7 +4992,7 @@
 </file>
 
 <file path=ppt/slides/slide10.xml><?xml version="1.0" encoding="utf-8"?>
-<p:sld xmlns:a="http://schemas.openxmlformats.org/drawingml/2006/main" xmlns:r="http://schemas.openxmlformats.org/officeDocument/2006/relationships" xmlns:p="http://schemas.openxmlformats.org/presentationml/2006/main">
+<p:sld xmlns:a="http://schemas.openxmlformats.org/drawingml/2006/main" xmlns:r="http://schemas.openxmlformats.org/officeDocument/2006/relationships" xmlns:p="http://schemas.openxmlformats.org/presentationml/2006/main" show="0">
   <p:cSld>
     <p:spTree>
       <p:nvGrpSpPr>
@@ -4852,11 +5023,7 @@
           <a:bodyPr/>
           <a:lstStyle/>
           <a:p>
-            <a:r>
-              <a:rPr lang="en-US" dirty="0" smtClean="0"/>
-              <a:t>Adjust parameters to clean text </a:t>
-            </a:r>
-            <a:endParaRPr lang="en-US" dirty="0"/>
+            <a:endParaRPr lang="en-US"/>
           </a:p>
         </p:txBody>
       </p:sp>
@@ -4872,39 +5039,16 @@
         </p:nvSpPr>
         <p:spPr/>
         <p:txBody>
-          <a:bodyPr>
-            <a:normAutofit/>
-          </a:bodyPr>
-          <a:lstStyle/>
-          <a:p>
-            <a:r>
-              <a:rPr lang="en-US" sz="1800" dirty="0" smtClean="0"/>
-              <a:t>Include </a:t>
-            </a:r>
-            <a:r>
-              <a:rPr lang="en-US" sz="1800" dirty="0" err="1" smtClean="0"/>
-              <a:t>stopwords</a:t>
-            </a:r>
-            <a:r>
-              <a:rPr lang="en-US" sz="1800" dirty="0" smtClean="0"/>
-              <a:t>:</a:t>
-            </a:r>
-          </a:p>
-          <a:p>
-            <a:pPr>
-              <a:buNone/>
-            </a:pPr>
-            <a:r>
-              <a:rPr lang="en-US" sz="1800" dirty="0" smtClean="0"/>
-              <a:t>	['anything', 'never', 'would', 'still', 'always', 'much', 'one', 'something', 'even']</a:t>
-            </a:r>
-            <a:endParaRPr lang="en-US" sz="1800" dirty="0"/>
+          <a:bodyPr/>
+          <a:lstStyle/>
+          <a:p>
+            <a:endParaRPr lang="en-US"/>
           </a:p>
         </p:txBody>
       </p:sp>
       <p:pic>
         <p:nvPicPr>
-          <p:cNvPr id="9218" name="Picture 2"/>
+          <p:cNvPr id="10243" name="Picture 3"/>
           <p:cNvPicPr>
             <a:picLocks noChangeAspect="1" noChangeArrowheads="1"/>
           </p:cNvPicPr>
@@ -4919,8 +5063,8 @@
         </p:blipFill>
         <p:spPr bwMode="auto">
           <a:xfrm>
-            <a:off x="638175" y="2492896"/>
-            <a:ext cx="7867650" cy="4033986"/>
+            <a:off x="109538" y="476672"/>
+            <a:ext cx="8924925" cy="6048672"/>
           </a:xfrm>
           <a:prstGeom prst="rect">
             <a:avLst/>
@@ -4939,6 +5083,7 @@
   <p:clrMapOvr>
     <a:masterClrMapping/>
   </p:clrMapOvr>
+  <p:transition/>
   <p:timing>
     <p:tnLst>
       <p:par>
@@ -4981,34 +5126,69 @@
           <a:bodyPr/>
           <a:lstStyle/>
           <a:p>
+            <a:endParaRPr lang="en-US"/>
+          </a:p>
+        </p:txBody>
+      </p:sp>
+      <p:sp>
+        <p:nvSpPr>
+          <p:cNvPr id="3" name="Content Placeholder 2"/>
+          <p:cNvSpPr>
+            <a:spLocks noGrp="1"/>
+          </p:cNvSpPr>
+          <p:nvPr>
+            <p:ph idx="1"/>
+          </p:nvPr>
+        </p:nvSpPr>
+        <p:spPr/>
+        <p:txBody>
+          <a:bodyPr/>
+          <a:lstStyle/>
+          <a:p>
+            <a:r>
+              <a:rPr lang="en-SG" dirty="0" smtClean="0"/>
+              <a:t>Initial </a:t>
+            </a:r>
+            <a:r>
+              <a:rPr lang="en-SG" dirty="0" err="1" smtClean="0"/>
+              <a:t>modeling</a:t>
+            </a:r>
+            <a:r>
+              <a:rPr lang="en-SG" dirty="0" smtClean="0"/>
+              <a:t> was done with naïve </a:t>
+            </a:r>
+            <a:r>
+              <a:rPr lang="en-SG" dirty="0" err="1" smtClean="0"/>
+              <a:t>bayes</a:t>
+            </a:r>
+            <a:r>
+              <a:rPr lang="en-SG" dirty="0" smtClean="0"/>
+              <a:t> classifier and database obtained from count </a:t>
+            </a:r>
+            <a:r>
+              <a:rPr lang="en-SG" dirty="0" err="1" smtClean="0"/>
+              <a:t>vectorizer</a:t>
+            </a:r>
+            <a:r>
+              <a:rPr lang="en-SG" dirty="0" smtClean="0"/>
+              <a:t> transformation.</a:t>
+            </a:r>
+          </a:p>
+          <a:p>
+            <a:r>
+              <a:rPr lang="en-SG" dirty="0" smtClean="0"/>
+              <a:t>To find out the common words learned by the model.</a:t>
+            </a:r>
+          </a:p>
+          <a:p>
+            <a:r>
+              <a:rPr lang="en-SG" dirty="0" smtClean="0"/>
+              <a:t>To try and include more stop words to increase model performance.</a:t>
+            </a:r>
             <a:endParaRPr lang="en-US" dirty="0"/>
           </a:p>
         </p:txBody>
       </p:sp>
-      <p:pic>
-        <p:nvPicPr>
-          <p:cNvPr id="6" name="Content Placeholder 5" descr="50_anxiety.png"/>
-          <p:cNvPicPr>
-            <a:picLocks noGrp="1" noChangeAspect="1"/>
-          </p:cNvPicPr>
-          <p:nvPr>
-            <p:ph idx="1"/>
-          </p:nvPr>
-        </p:nvPicPr>
-        <p:blipFill>
-          <a:blip r:embed="rId3" cstate="print"/>
-          <a:srcRect l="7375" t="8744" r="8344" b="9081"/>
-          <a:stretch>
-            <a:fillRect/>
-          </a:stretch>
-        </p:blipFill>
-        <p:spPr>
-          <a:xfrm>
-            <a:off x="0" y="-11183"/>
-            <a:ext cx="8964488" cy="6869183"/>
-          </a:xfrm>
-        </p:spPr>
-      </p:pic>
     </p:spTree>
   </p:cSld>
   <p:clrMapOvr>
@@ -5060,28 +5240,76 @@
           </a:p>
         </p:txBody>
       </p:sp>
+      <p:sp>
+        <p:nvSpPr>
+          <p:cNvPr id="3" name="Content Placeholder 2"/>
+          <p:cNvSpPr>
+            <a:spLocks noGrp="1"/>
+          </p:cNvSpPr>
+          <p:nvPr>
+            <p:ph idx="1"/>
+          </p:nvPr>
+        </p:nvSpPr>
+        <p:spPr>
+          <a:xfrm>
+            <a:off x="4067944" y="1628800"/>
+            <a:ext cx="3106688" cy="3993307"/>
+          </a:xfrm>
+        </p:spPr>
+        <p:txBody>
+          <a:bodyPr/>
+          <a:lstStyle/>
+          <a:p>
+            <a:r>
+              <a:rPr lang="en-SG" dirty="0" smtClean="0"/>
+              <a:t>List of common words between Depression and Anxiety after </a:t>
+            </a:r>
+            <a:r>
+              <a:rPr lang="en-SG" dirty="0" err="1" smtClean="0"/>
+              <a:t>nb_cvec</a:t>
+            </a:r>
+            <a:r>
+              <a:rPr lang="en-SG" dirty="0" smtClean="0"/>
+              <a:t> </a:t>
+            </a:r>
+            <a:r>
+              <a:rPr lang="en-SG" dirty="0" err="1" smtClean="0"/>
+              <a:t>modeling</a:t>
+            </a:r>
+            <a:endParaRPr lang="en-US" dirty="0"/>
+          </a:p>
+        </p:txBody>
+      </p:sp>
       <p:pic>
         <p:nvPicPr>
-          <p:cNvPr id="4" name="Content Placeholder 3" descr="50_dep.png"/>
+          <p:cNvPr id="1026" name="Picture 2"/>
           <p:cNvPicPr>
-            <a:picLocks noGrp="1" noChangeAspect="1"/>
+            <a:picLocks noChangeAspect="1" noChangeArrowheads="1"/>
           </p:cNvPicPr>
-          <p:nvPr>
-            <p:ph idx="1"/>
-          </p:nvPr>
+          <p:nvPr/>
         </p:nvPicPr>
         <p:blipFill>
-          <a:blip r:embed="rId3" cstate="print"/>
-          <a:srcRect l="6416" t="9830" r="9294" b="9323"/>
+          <a:blip r:embed="rId2" cstate="print"/>
+          <a:srcRect l="19747" r="49326"/>
           <a:stretch>
             <a:fillRect/>
           </a:stretch>
         </p:blipFill>
-        <p:spPr>
+        <p:spPr bwMode="auto">
           <a:xfrm>
-            <a:off x="0" y="0"/>
-            <a:ext cx="9144000" cy="6858000"/>
+            <a:off x="1691680" y="-6524"/>
+            <a:ext cx="1800200" cy="6819900"/>
           </a:xfrm>
+          <a:prstGeom prst="rect">
+            <a:avLst/>
+          </a:prstGeom>
+          <a:noFill/>
+          <a:ln w="9525">
+            <a:noFill/>
+            <a:miter lim="800000"/>
+            <a:headEnd/>
+            <a:tailEnd/>
+          </a:ln>
         </p:spPr>
       </p:pic>
     </p:spTree>
@@ -5128,6 +5356,361 @@
         </p:nvSpPr>
         <p:spPr/>
         <p:txBody>
+          <a:bodyPr>
+            <a:normAutofit fontScale="90000"/>
+          </a:bodyPr>
+          <a:lstStyle/>
+          <a:p>
+            <a:r>
+              <a:rPr lang="en-US" dirty="0" smtClean="0"/>
+              <a:t>Include more stop words </a:t>
+            </a:r>
+            <a:r>
+              <a:rPr lang="en-US" dirty="0" smtClean="0"/>
+              <a:t>to clean text </a:t>
+            </a:r>
+            <a:endParaRPr lang="en-US" dirty="0"/>
+          </a:p>
+        </p:txBody>
+      </p:sp>
+      <p:sp>
+        <p:nvSpPr>
+          <p:cNvPr id="3" name="Content Placeholder 2"/>
+          <p:cNvSpPr>
+            <a:spLocks noGrp="1"/>
+          </p:cNvSpPr>
+          <p:nvPr>
+            <p:ph idx="1"/>
+          </p:nvPr>
+        </p:nvSpPr>
+        <p:spPr/>
+        <p:txBody>
+          <a:bodyPr>
+            <a:normAutofit/>
+          </a:bodyPr>
+          <a:lstStyle/>
+          <a:p>
+            <a:r>
+              <a:rPr lang="en-US" sz="1800" dirty="0" smtClean="0"/>
+              <a:t>Include </a:t>
+            </a:r>
+            <a:r>
+              <a:rPr lang="en-US" sz="1800" dirty="0" err="1" smtClean="0"/>
+              <a:t>stopwords</a:t>
+            </a:r>
+            <a:r>
+              <a:rPr lang="en-US" sz="1800" dirty="0" smtClean="0"/>
+              <a:t>:</a:t>
+            </a:r>
+          </a:p>
+          <a:p>
+            <a:pPr>
+              <a:buNone/>
+            </a:pPr>
+            <a:r>
+              <a:rPr lang="en-US" sz="1800" dirty="0" smtClean="0"/>
+              <a:t>	['anything', 'never', 'would', 'still', 'always', 'much', 'one', 'something', 'even']</a:t>
+            </a:r>
+            <a:endParaRPr lang="en-US" sz="1800" dirty="0"/>
+          </a:p>
+        </p:txBody>
+      </p:sp>
+      <p:pic>
+        <p:nvPicPr>
+          <p:cNvPr id="9218" name="Picture 2"/>
+          <p:cNvPicPr>
+            <a:picLocks noChangeAspect="1" noChangeArrowheads="1"/>
+          </p:cNvPicPr>
+          <p:nvPr/>
+        </p:nvPicPr>
+        <p:blipFill>
+          <a:blip r:embed="rId2" cstate="print"/>
+          <a:srcRect/>
+          <a:stretch>
+            <a:fillRect/>
+          </a:stretch>
+        </p:blipFill>
+        <p:spPr bwMode="auto">
+          <a:xfrm>
+            <a:off x="638175" y="2492896"/>
+            <a:ext cx="7867650" cy="4033986"/>
+          </a:xfrm>
+          <a:prstGeom prst="rect">
+            <a:avLst/>
+          </a:prstGeom>
+          <a:noFill/>
+          <a:ln w="9525">
+            <a:noFill/>
+            <a:miter lim="800000"/>
+            <a:headEnd/>
+            <a:tailEnd/>
+          </a:ln>
+        </p:spPr>
+      </p:pic>
+      <p:sp>
+        <p:nvSpPr>
+          <p:cNvPr id="6" name="TextBox 5"/>
+          <p:cNvSpPr txBox="1"/>
+          <p:nvPr/>
+        </p:nvSpPr>
+        <p:spPr>
+          <a:xfrm>
+            <a:off x="5220072" y="5682734"/>
+            <a:ext cx="3600400" cy="338554"/>
+          </a:xfrm>
+          <a:prstGeom prst="rect">
+            <a:avLst/>
+          </a:prstGeom>
+          <a:noFill/>
+          <a:ln w="19050">
+            <a:solidFill>
+              <a:srgbClr val="FF0000"/>
+            </a:solidFill>
+          </a:ln>
+        </p:spPr>
+        <p:txBody>
+          <a:bodyPr wrap="square" rtlCol="0">
+            <a:spAutoFit/>
+          </a:bodyPr>
+          <a:lstStyle/>
+          <a:p>
+            <a:r>
+              <a:rPr lang="en-SG" sz="1600" dirty="0" smtClean="0"/>
+              <a:t>Before additional stop words added</a:t>
+            </a:r>
+            <a:endParaRPr lang="en-US" sz="1600" dirty="0"/>
+          </a:p>
+        </p:txBody>
+      </p:sp>
+      <p:sp>
+        <p:nvSpPr>
+          <p:cNvPr id="7" name="TextBox 6"/>
+          <p:cNvSpPr txBox="1"/>
+          <p:nvPr/>
+        </p:nvSpPr>
+        <p:spPr>
+          <a:xfrm>
+            <a:off x="5220072" y="6093296"/>
+            <a:ext cx="3600400" cy="338554"/>
+          </a:xfrm>
+          <a:prstGeom prst="rect">
+            <a:avLst/>
+          </a:prstGeom>
+          <a:noFill/>
+          <a:ln w="19050">
+            <a:solidFill>
+              <a:srgbClr val="FF0000"/>
+            </a:solidFill>
+          </a:ln>
+        </p:spPr>
+        <p:txBody>
+          <a:bodyPr wrap="square" rtlCol="0">
+            <a:spAutoFit/>
+          </a:bodyPr>
+          <a:lstStyle/>
+          <a:p>
+            <a:r>
+              <a:rPr lang="en-SG" sz="1600" dirty="0" smtClean="0"/>
+              <a:t>After additional stop words added</a:t>
+            </a:r>
+            <a:endParaRPr lang="en-US" sz="1600" dirty="0"/>
+          </a:p>
+        </p:txBody>
+      </p:sp>
+    </p:spTree>
+  </p:cSld>
+  <p:clrMapOvr>
+    <a:masterClrMapping/>
+  </p:clrMapOvr>
+  <p:timing>
+    <p:tnLst>
+      <p:par>
+        <p:cTn id="1" dur="indefinite" restart="never" nodeType="tmRoot"/>
+      </p:par>
+    </p:tnLst>
+  </p:timing>
+</p:sld>
+</file>
+
+<file path=ppt/slides/slide14.xml><?xml version="1.0" encoding="utf-8"?>
+<p:sld xmlns:a="http://schemas.openxmlformats.org/drawingml/2006/main" xmlns:r="http://schemas.openxmlformats.org/officeDocument/2006/relationships" xmlns:p="http://schemas.openxmlformats.org/presentationml/2006/main">
+  <p:cSld>
+    <p:spTree>
+      <p:nvGrpSpPr>
+        <p:cNvPr id="1" name=""/>
+        <p:cNvGrpSpPr/>
+        <p:nvPr/>
+      </p:nvGrpSpPr>
+      <p:grpSpPr>
+        <a:xfrm>
+          <a:off x="0" y="0"/>
+          <a:ext cx="0" cy="0"/>
+          <a:chOff x="0" y="0"/>
+          <a:chExt cx="0" cy="0"/>
+        </a:xfrm>
+      </p:grpSpPr>
+      <p:sp>
+        <p:nvSpPr>
+          <p:cNvPr id="2" name="Title 1"/>
+          <p:cNvSpPr>
+            <a:spLocks noGrp="1"/>
+          </p:cNvSpPr>
+          <p:nvPr>
+            <p:ph type="title"/>
+          </p:nvPr>
+        </p:nvSpPr>
+        <p:spPr/>
+        <p:txBody>
+          <a:bodyPr/>
+          <a:lstStyle/>
+          <a:p>
+            <a:endParaRPr lang="en-US" dirty="0"/>
+          </a:p>
+        </p:txBody>
+      </p:sp>
+      <p:pic>
+        <p:nvPicPr>
+          <p:cNvPr id="6" name="Content Placeholder 5" descr="50_anxiety.png"/>
+          <p:cNvPicPr>
+            <a:picLocks noGrp="1" noChangeAspect="1"/>
+          </p:cNvPicPr>
+          <p:nvPr>
+            <p:ph idx="1"/>
+          </p:nvPr>
+        </p:nvPicPr>
+        <p:blipFill>
+          <a:blip r:embed="rId3" cstate="print"/>
+          <a:srcRect l="7375" t="8744" r="8344" b="9081"/>
+          <a:stretch>
+            <a:fillRect/>
+          </a:stretch>
+        </p:blipFill>
+        <p:spPr>
+          <a:xfrm>
+            <a:off x="0" y="-11183"/>
+            <a:ext cx="8964488" cy="6869183"/>
+          </a:xfrm>
+        </p:spPr>
+      </p:pic>
+    </p:spTree>
+  </p:cSld>
+  <p:clrMapOvr>
+    <a:masterClrMapping/>
+  </p:clrMapOvr>
+  <p:timing>
+    <p:tnLst>
+      <p:par>
+        <p:cTn id="1" dur="indefinite" restart="never" nodeType="tmRoot"/>
+      </p:par>
+    </p:tnLst>
+  </p:timing>
+</p:sld>
+</file>
+
+<file path=ppt/slides/slide15.xml><?xml version="1.0" encoding="utf-8"?>
+<p:sld xmlns:a="http://schemas.openxmlformats.org/drawingml/2006/main" xmlns:r="http://schemas.openxmlformats.org/officeDocument/2006/relationships" xmlns:p="http://schemas.openxmlformats.org/presentationml/2006/main">
+  <p:cSld>
+    <p:spTree>
+      <p:nvGrpSpPr>
+        <p:cNvPr id="1" name=""/>
+        <p:cNvGrpSpPr/>
+        <p:nvPr/>
+      </p:nvGrpSpPr>
+      <p:grpSpPr>
+        <a:xfrm>
+          <a:off x="0" y="0"/>
+          <a:ext cx="0" cy="0"/>
+          <a:chOff x="0" y="0"/>
+          <a:chExt cx="0" cy="0"/>
+        </a:xfrm>
+      </p:grpSpPr>
+      <p:sp>
+        <p:nvSpPr>
+          <p:cNvPr id="2" name="Title 1"/>
+          <p:cNvSpPr>
+            <a:spLocks noGrp="1"/>
+          </p:cNvSpPr>
+          <p:nvPr>
+            <p:ph type="title"/>
+          </p:nvPr>
+        </p:nvSpPr>
+        <p:spPr/>
+        <p:txBody>
+          <a:bodyPr/>
+          <a:lstStyle/>
+          <a:p>
+            <a:endParaRPr lang="en-US"/>
+          </a:p>
+        </p:txBody>
+      </p:sp>
+      <p:pic>
+        <p:nvPicPr>
+          <p:cNvPr id="4" name="Content Placeholder 3" descr="50_dep.png"/>
+          <p:cNvPicPr>
+            <a:picLocks noGrp="1" noChangeAspect="1"/>
+          </p:cNvPicPr>
+          <p:nvPr>
+            <p:ph idx="1"/>
+          </p:nvPr>
+        </p:nvPicPr>
+        <p:blipFill>
+          <a:blip r:embed="rId3" cstate="print"/>
+          <a:srcRect l="6416" t="9830" r="9294" b="9323"/>
+          <a:stretch>
+            <a:fillRect/>
+          </a:stretch>
+        </p:blipFill>
+        <p:spPr>
+          <a:xfrm>
+            <a:off x="0" y="0"/>
+            <a:ext cx="9144000" cy="6858000"/>
+          </a:xfrm>
+        </p:spPr>
+      </p:pic>
+    </p:spTree>
+  </p:cSld>
+  <p:clrMapOvr>
+    <a:masterClrMapping/>
+  </p:clrMapOvr>
+  <p:timing>
+    <p:tnLst>
+      <p:par>
+        <p:cTn id="1" dur="indefinite" restart="never" nodeType="tmRoot"/>
+      </p:par>
+    </p:tnLst>
+  </p:timing>
+</p:sld>
+</file>
+
+<file path=ppt/slides/slide16.xml><?xml version="1.0" encoding="utf-8"?>
+<p:sld xmlns:a="http://schemas.openxmlformats.org/drawingml/2006/main" xmlns:r="http://schemas.openxmlformats.org/officeDocument/2006/relationships" xmlns:p="http://schemas.openxmlformats.org/presentationml/2006/main">
+  <p:cSld>
+    <p:spTree>
+      <p:nvGrpSpPr>
+        <p:cNvPr id="1" name=""/>
+        <p:cNvGrpSpPr/>
+        <p:nvPr/>
+      </p:nvGrpSpPr>
+      <p:grpSpPr>
+        <a:xfrm>
+          <a:off x="0" y="0"/>
+          <a:ext cx="0" cy="0"/>
+          <a:chOff x="0" y="0"/>
+          <a:chExt cx="0" cy="0"/>
+        </a:xfrm>
+      </p:grpSpPr>
+      <p:sp>
+        <p:nvSpPr>
+          <p:cNvPr id="2" name="Title 1"/>
+          <p:cNvSpPr>
+            <a:spLocks noGrp="1"/>
+          </p:cNvSpPr>
+          <p:nvPr>
+            <p:ph type="title"/>
+          </p:nvPr>
+        </p:nvSpPr>
+        <p:spPr/>
+        <p:txBody>
           <a:bodyPr/>
           <a:lstStyle/>
           <a:p>
@@ -5186,6 +5769,41 @@
           </a:ln>
         </p:spPr>
       </p:pic>
+      <p:sp>
+        <p:nvSpPr>
+          <p:cNvPr id="6" name="TextBox 5"/>
+          <p:cNvSpPr txBox="1"/>
+          <p:nvPr/>
+        </p:nvSpPr>
+        <p:spPr>
+          <a:xfrm>
+            <a:off x="4427984" y="5589240"/>
+            <a:ext cx="4536504" cy="338554"/>
+          </a:xfrm>
+          <a:prstGeom prst="rect">
+            <a:avLst/>
+          </a:prstGeom>
+          <a:noFill/>
+          <a:ln w="19050">
+            <a:solidFill>
+              <a:srgbClr val="FF0000"/>
+            </a:solidFill>
+          </a:ln>
+        </p:spPr>
+        <p:txBody>
+          <a:bodyPr wrap="square" rtlCol="0">
+            <a:spAutoFit/>
+          </a:bodyPr>
+          <a:lstStyle/>
+          <a:p>
+            <a:r>
+              <a:rPr lang="en-SG" sz="1600" dirty="0" smtClean="0"/>
+              <a:t>  </a:t>
+            </a:r>
+            <a:endParaRPr lang="en-US" sz="1600" dirty="0"/>
+          </a:p>
+        </p:txBody>
+      </p:sp>
     </p:spTree>
   </p:cSld>
   <p:clrMapOvr>
@@ -5201,8 +5819,8 @@
 </p:sld>
 </file>
 
-<file path=ppt/slides/slide14.xml><?xml version="1.0" encoding="utf-8"?>
-<p:sld xmlns:a="http://schemas.openxmlformats.org/drawingml/2006/main" xmlns:r="http://schemas.openxmlformats.org/officeDocument/2006/relationships" xmlns:p="http://schemas.openxmlformats.org/presentationml/2006/main">
+<file path=ppt/slides/slide17.xml><?xml version="1.0" encoding="utf-8"?>
+<p:sld xmlns:a="http://schemas.openxmlformats.org/drawingml/2006/main" xmlns:r="http://schemas.openxmlformats.org/officeDocument/2006/relationships" xmlns:p="http://schemas.openxmlformats.org/presentationml/2006/main" show="0">
   <p:cSld>
     <p:spTree>
       <p:nvGrpSpPr>
@@ -5237,7 +5855,7 @@
           <a:p>
             <a:r>
               <a:rPr lang="en-US" dirty="0" smtClean="0"/>
-              <a:t>Linear Regression / </a:t>
+              <a:t>Logistic Regression / </a:t>
             </a:r>
             <a:r>
               <a:rPr lang="en-US" dirty="0" err="1" smtClean="0"/>
@@ -5315,6 +5933,7 @@
   <p:clrMapOvr>
     <a:masterClrMapping/>
   </p:clrMapOvr>
+  <p:transition/>
   <p:timing>
     <p:tnLst>
       <p:par>
@@ -5325,7 +5944,7 @@
 </p:sld>
 </file>
 
-<file path=ppt/slides/slide15.xml><?xml version="1.0" encoding="utf-8"?>
+<file path=ppt/slides/slide18.xml><?xml version="1.0" encoding="utf-8"?>
 <p:sld xmlns:a="http://schemas.openxmlformats.org/drawingml/2006/main" xmlns:r="http://schemas.openxmlformats.org/officeDocument/2006/relationships" xmlns:p="http://schemas.openxmlformats.org/presentationml/2006/main">
   <p:cSld>
     <p:spTree>
@@ -5400,7 +6019,7 @@
 </p:sld>
 </file>
 
-<file path=ppt/slides/slide16.xml><?xml version="1.0" encoding="utf-8"?>
+<file path=ppt/slides/slide19.xml><?xml version="1.0" encoding="utf-8"?>
 <p:sld xmlns:a="http://schemas.openxmlformats.org/drawingml/2006/main" xmlns:r="http://schemas.openxmlformats.org/officeDocument/2006/relationships" xmlns:p="http://schemas.openxmlformats.org/presentationml/2006/main">
   <p:cSld>
     <p:spTree>
@@ -5527,150 +6146,6 @@
 </p:sld>
 </file>
 
-<file path=ppt/slides/slide17.xml><?xml version="1.0" encoding="utf-8"?>
-<p:sld xmlns:a="http://schemas.openxmlformats.org/drawingml/2006/main" xmlns:r="http://schemas.openxmlformats.org/officeDocument/2006/relationships" xmlns:p="http://schemas.openxmlformats.org/presentationml/2006/main">
-  <p:cSld>
-    <p:spTree>
-      <p:nvGrpSpPr>
-        <p:cNvPr id="1" name=""/>
-        <p:cNvGrpSpPr/>
-        <p:nvPr/>
-      </p:nvGrpSpPr>
-      <p:grpSpPr>
-        <a:xfrm>
-          <a:off x="0" y="0"/>
-          <a:ext cx="0" cy="0"/>
-          <a:chOff x="0" y="0"/>
-          <a:chExt cx="0" cy="0"/>
-        </a:xfrm>
-      </p:grpSpPr>
-      <p:sp>
-        <p:nvSpPr>
-          <p:cNvPr id="2" name="Title 1"/>
-          <p:cNvSpPr>
-            <a:spLocks noGrp="1"/>
-          </p:cNvSpPr>
-          <p:nvPr>
-            <p:ph type="title"/>
-          </p:nvPr>
-        </p:nvSpPr>
-        <p:spPr/>
-        <p:txBody>
-          <a:bodyPr/>
-          <a:lstStyle/>
-          <a:p>
-            <a:pPr algn="l"/>
-            <a:r>
-              <a:rPr lang="en-US" dirty="0" smtClean="0"/>
-              <a:t>Recommendations &amp; Conclusion</a:t>
-            </a:r>
-            <a:endParaRPr lang="en-US" dirty="0"/>
-          </a:p>
-        </p:txBody>
-      </p:sp>
-      <p:sp>
-        <p:nvSpPr>
-          <p:cNvPr id="3" name="Content Placeholder 2"/>
-          <p:cNvSpPr>
-            <a:spLocks noGrp="1"/>
-          </p:cNvSpPr>
-          <p:nvPr>
-            <p:ph idx="1"/>
-          </p:nvPr>
-        </p:nvSpPr>
-        <p:spPr/>
-        <p:txBody>
-          <a:bodyPr>
-            <a:normAutofit fontScale="92500" lnSpcReduction="20000"/>
-          </a:bodyPr>
-          <a:lstStyle/>
-          <a:p>
-            <a:r>
-              <a:rPr lang="en-US" dirty="0" err="1" smtClean="0"/>
-              <a:t>lr_cvec</a:t>
-            </a:r>
-            <a:r>
-              <a:rPr lang="en-US" dirty="0" smtClean="0"/>
-              <a:t> </a:t>
-            </a:r>
-            <a:r>
-              <a:rPr lang="en-US" dirty="0"/>
-              <a:t>can be utilized to identify posts from individuals showing signs or symptoms of depression or anxiety. </a:t>
-            </a:r>
-            <a:endParaRPr lang="en-US" dirty="0" smtClean="0"/>
-          </a:p>
-          <a:p>
-            <a:endParaRPr lang="en-US" dirty="0"/>
-          </a:p>
-          <a:p>
-            <a:r>
-              <a:rPr lang="en-US" dirty="0" smtClean="0"/>
-              <a:t>If </a:t>
-            </a:r>
-            <a:r>
-              <a:rPr lang="en-US" dirty="0"/>
-              <a:t>the text is about depression, </a:t>
-            </a:r>
-            <a:r>
-              <a:rPr lang="en-US" dirty="0" err="1"/>
-              <a:t>lr_cvec</a:t>
-            </a:r>
-            <a:r>
-              <a:rPr lang="en-US" dirty="0"/>
-              <a:t> can predict with 97.6% accuracy. Whereas, if the text is about anxiety, </a:t>
-            </a:r>
-            <a:r>
-              <a:rPr lang="en-US" dirty="0" err="1"/>
-              <a:t>lr_cvec</a:t>
-            </a:r>
-            <a:r>
-              <a:rPr lang="en-US" dirty="0"/>
-              <a:t> can predict with 93.1% accuracy. </a:t>
-            </a:r>
-            <a:endParaRPr lang="en-US" dirty="0" smtClean="0"/>
-          </a:p>
-          <a:p>
-            <a:pPr>
-              <a:buNone/>
-            </a:pPr>
-            <a:endParaRPr lang="en-US" dirty="0" smtClean="0"/>
-          </a:p>
-          <a:p>
-            <a:r>
-              <a:rPr lang="en-US" dirty="0"/>
-              <a:t>Other prominent </a:t>
-            </a:r>
-            <a:r>
-              <a:rPr lang="en-US" dirty="0" smtClean="0"/>
-              <a:t>words are</a:t>
-            </a:r>
-            <a:r>
-              <a:rPr lang="en-US" dirty="0"/>
-              <a:t> life, happy, kill, suicide, sad and </a:t>
-            </a:r>
-            <a:r>
-              <a:rPr lang="en-US" dirty="0" smtClean="0"/>
-              <a:t>suicidal.</a:t>
-            </a:r>
-            <a:endParaRPr lang="en-US" dirty="0"/>
-          </a:p>
-        </p:txBody>
-      </p:sp>
-    </p:spTree>
-  </p:cSld>
-  <p:clrMapOvr>
-    <a:masterClrMapping/>
-  </p:clrMapOvr>
-  <p:timing>
-    <p:tnLst>
-      <p:par>
-        <p:cTn id="1" dur="indefinite" restart="never" nodeType="tmRoot"/>
-      </p:par>
-    </p:tnLst>
-  </p:timing>
-</p:sld>
-</file>
-
 <file path=ppt/slides/slide2.xml><?xml version="1.0" encoding="utf-8"?>
 <p:sld xmlns:a="http://schemas.openxmlformats.org/drawingml/2006/main" xmlns:r="http://schemas.openxmlformats.org/officeDocument/2006/relationships" xmlns:p="http://schemas.openxmlformats.org/presentationml/2006/main">
   <p:cSld>
@@ -5776,6 +6251,315 @@
               <a:rPr lang="en-US" dirty="0" smtClean="0"/>
               <a:t>Source: https://www.verywellmind.com/am-i-anxious-4045683</a:t>
             </a:r>
+            <a:endParaRPr lang="en-US" dirty="0"/>
+          </a:p>
+        </p:txBody>
+      </p:sp>
+    </p:spTree>
+  </p:cSld>
+  <p:clrMapOvr>
+    <a:masterClrMapping/>
+  </p:clrMapOvr>
+  <p:timing>
+    <p:tnLst>
+      <p:par>
+        <p:cTn id="1" dur="indefinite" restart="never" nodeType="tmRoot"/>
+      </p:par>
+    </p:tnLst>
+  </p:timing>
+</p:sld>
+</file>
+
+<file path=ppt/slides/slide20.xml><?xml version="1.0" encoding="utf-8"?>
+<p:sld xmlns:a="http://schemas.openxmlformats.org/drawingml/2006/main" xmlns:r="http://schemas.openxmlformats.org/officeDocument/2006/relationships" xmlns:p="http://schemas.openxmlformats.org/presentationml/2006/main">
+  <p:cSld>
+    <p:spTree>
+      <p:nvGrpSpPr>
+        <p:cNvPr id="1" name=""/>
+        <p:cNvGrpSpPr/>
+        <p:nvPr/>
+      </p:nvGrpSpPr>
+      <p:grpSpPr>
+        <a:xfrm>
+          <a:off x="0" y="0"/>
+          <a:ext cx="0" cy="0"/>
+          <a:chOff x="0" y="0"/>
+          <a:chExt cx="0" cy="0"/>
+        </a:xfrm>
+      </p:grpSpPr>
+      <p:sp>
+        <p:nvSpPr>
+          <p:cNvPr id="2" name="Title 1"/>
+          <p:cNvSpPr>
+            <a:spLocks noGrp="1"/>
+          </p:cNvSpPr>
+          <p:nvPr>
+            <p:ph type="title"/>
+          </p:nvPr>
+        </p:nvSpPr>
+        <p:spPr/>
+        <p:txBody>
+          <a:bodyPr/>
+          <a:lstStyle/>
+          <a:p>
+            <a:pPr algn="l"/>
+            <a:r>
+              <a:rPr lang="en-US" dirty="0" smtClean="0"/>
+              <a:t>Recommendations &amp; Conclusion</a:t>
+            </a:r>
+            <a:endParaRPr lang="en-US" dirty="0"/>
+          </a:p>
+        </p:txBody>
+      </p:sp>
+      <p:sp>
+        <p:nvSpPr>
+          <p:cNvPr id="3" name="Content Placeholder 2"/>
+          <p:cNvSpPr>
+            <a:spLocks noGrp="1"/>
+          </p:cNvSpPr>
+          <p:nvPr>
+            <p:ph idx="1"/>
+          </p:nvPr>
+        </p:nvSpPr>
+        <p:spPr>
+          <a:xfrm>
+            <a:off x="457200" y="1783357"/>
+            <a:ext cx="8229600" cy="4525963"/>
+          </a:xfrm>
+        </p:spPr>
+        <p:txBody>
+          <a:bodyPr>
+            <a:normAutofit fontScale="70000" lnSpcReduction="20000"/>
+          </a:bodyPr>
+          <a:lstStyle/>
+          <a:p>
+            <a:r>
+              <a:rPr lang="en-US" dirty="0" err="1" smtClean="0"/>
+              <a:t>lr_cvec</a:t>
+            </a:r>
+            <a:r>
+              <a:rPr lang="en-US" dirty="0" smtClean="0"/>
+              <a:t> is selected as the final model. It has the lowest difference between baseline and validation score which is 8%. </a:t>
+            </a:r>
+          </a:p>
+          <a:p>
+            <a:endParaRPr lang="en-US" dirty="0"/>
+          </a:p>
+          <a:p>
+            <a:r>
+              <a:rPr lang="en-US" dirty="0" smtClean="0"/>
+              <a:t>If </a:t>
+            </a:r>
+            <a:r>
+              <a:rPr lang="en-US" dirty="0"/>
+              <a:t>the text is about depression, </a:t>
+            </a:r>
+            <a:r>
+              <a:rPr lang="en-US" dirty="0" err="1"/>
+              <a:t>lr_cvec</a:t>
+            </a:r>
+            <a:r>
+              <a:rPr lang="en-US" dirty="0"/>
+              <a:t> can predict with </a:t>
+            </a:r>
+            <a:r>
+              <a:rPr lang="en-US" dirty="0" smtClean="0"/>
+              <a:t>92% </a:t>
+            </a:r>
+            <a:r>
+              <a:rPr lang="en-US" dirty="0"/>
+              <a:t>accuracy. Whereas, if the text is about anxiety, </a:t>
+            </a:r>
+            <a:r>
+              <a:rPr lang="en-US" dirty="0" err="1"/>
+              <a:t>lr_cvec</a:t>
+            </a:r>
+            <a:r>
+              <a:rPr lang="en-US" dirty="0"/>
+              <a:t> can predict with </a:t>
+            </a:r>
+            <a:r>
+              <a:rPr lang="en-US" dirty="0" smtClean="0"/>
+              <a:t>82% </a:t>
+            </a:r>
+            <a:r>
+              <a:rPr lang="en-US" dirty="0"/>
+              <a:t>accuracy. </a:t>
+            </a:r>
+            <a:endParaRPr lang="en-US" dirty="0" smtClean="0"/>
+          </a:p>
+          <a:p>
+            <a:pPr>
+              <a:buNone/>
+            </a:pPr>
+            <a:endParaRPr lang="en-US" dirty="0" smtClean="0"/>
+          </a:p>
+          <a:p>
+            <a:r>
+              <a:rPr lang="en-US" dirty="0"/>
+              <a:t>Other prominent </a:t>
+            </a:r>
+            <a:r>
+              <a:rPr lang="en-US" dirty="0" smtClean="0"/>
+              <a:t>words increasing the propensity of predicting for depression are</a:t>
+            </a:r>
+            <a:r>
+              <a:rPr lang="en-US" dirty="0"/>
+              <a:t> life, happy, kill, suicide, sad and </a:t>
+            </a:r>
+            <a:r>
+              <a:rPr lang="en-US" dirty="0" smtClean="0"/>
+              <a:t>suicidal.</a:t>
+            </a:r>
+          </a:p>
+          <a:p>
+            <a:pPr>
+              <a:buNone/>
+            </a:pPr>
+            <a:endParaRPr lang="en-US" dirty="0" smtClean="0"/>
+          </a:p>
+          <a:p>
+            <a:r>
+              <a:rPr lang="en-SG" dirty="0" smtClean="0"/>
+              <a:t>There are many common words shared between </a:t>
+            </a:r>
+            <a:r>
+              <a:rPr lang="en-SG" dirty="0" smtClean="0"/>
+              <a:t>Depression </a:t>
+            </a:r>
+            <a:r>
+              <a:rPr lang="en-SG" dirty="0" smtClean="0"/>
+              <a:t>and Anxiety.</a:t>
+            </a:r>
+            <a:endParaRPr lang="en-US" dirty="0"/>
+          </a:p>
+        </p:txBody>
+      </p:sp>
+    </p:spTree>
+  </p:cSld>
+  <p:clrMapOvr>
+    <a:masterClrMapping/>
+  </p:clrMapOvr>
+  <p:timing>
+    <p:tnLst>
+      <p:par>
+        <p:cTn id="1" dur="indefinite" restart="never" nodeType="tmRoot"/>
+      </p:par>
+    </p:tnLst>
+  </p:timing>
+</p:sld>
+</file>
+
+<file path=ppt/slides/slide21.xml><?xml version="1.0" encoding="utf-8"?>
+<p:sld xmlns:a="http://schemas.openxmlformats.org/drawingml/2006/main" xmlns:r="http://schemas.openxmlformats.org/officeDocument/2006/relationships" xmlns:p="http://schemas.openxmlformats.org/presentationml/2006/main">
+  <p:cSld>
+    <p:spTree>
+      <p:nvGrpSpPr>
+        <p:cNvPr id="1" name=""/>
+        <p:cNvGrpSpPr/>
+        <p:nvPr/>
+      </p:nvGrpSpPr>
+      <p:grpSpPr>
+        <a:xfrm>
+          <a:off x="0" y="0"/>
+          <a:ext cx="0" cy="0"/>
+          <a:chOff x="0" y="0"/>
+          <a:chExt cx="0" cy="0"/>
+        </a:xfrm>
+      </p:grpSpPr>
+      <p:sp>
+        <p:nvSpPr>
+          <p:cNvPr id="2" name="Title 1"/>
+          <p:cNvSpPr>
+            <a:spLocks noGrp="1"/>
+          </p:cNvSpPr>
+          <p:nvPr>
+            <p:ph type="title"/>
+          </p:nvPr>
+        </p:nvSpPr>
+        <p:spPr/>
+        <p:txBody>
+          <a:bodyPr>
+            <a:normAutofit fontScale="90000"/>
+          </a:bodyPr>
+          <a:lstStyle/>
+          <a:p>
+            <a:r>
+              <a:rPr lang="en-SG" dirty="0" smtClean="0"/>
+              <a:t>Improvements to data processing and </a:t>
+            </a:r>
+            <a:r>
+              <a:rPr lang="en-SG" dirty="0" err="1" smtClean="0"/>
+              <a:t>modeling</a:t>
+            </a:r>
+            <a:endParaRPr lang="en-US" dirty="0"/>
+          </a:p>
+        </p:txBody>
+      </p:sp>
+      <p:sp>
+        <p:nvSpPr>
+          <p:cNvPr id="3" name="Content Placeholder 2"/>
+          <p:cNvSpPr>
+            <a:spLocks noGrp="1"/>
+          </p:cNvSpPr>
+          <p:nvPr>
+            <p:ph idx="1"/>
+          </p:nvPr>
+        </p:nvSpPr>
+        <p:spPr/>
+        <p:txBody>
+          <a:bodyPr/>
+          <a:lstStyle/>
+          <a:p>
+            <a:r>
+              <a:rPr lang="en-SG" dirty="0" smtClean="0"/>
+              <a:t>Include more stop words.</a:t>
+            </a:r>
+          </a:p>
+          <a:p>
+            <a:r>
+              <a:rPr lang="en-SG" dirty="0" smtClean="0"/>
+              <a:t>Try out more classifiers like decision tree classifier, Random Forest classifier and </a:t>
+            </a:r>
+            <a:r>
+              <a:rPr lang="en-SG" dirty="0" err="1" smtClean="0"/>
+              <a:t>Xgboost</a:t>
+            </a:r>
+            <a:r>
+              <a:rPr lang="en-SG" dirty="0" smtClean="0"/>
+              <a:t> classifier.</a:t>
+            </a:r>
+          </a:p>
+          <a:p>
+            <a:r>
+              <a:rPr lang="en-SG" dirty="0" smtClean="0"/>
+              <a:t>Try out Stemming also.</a:t>
+            </a:r>
+          </a:p>
+          <a:p>
+            <a:r>
+              <a:rPr lang="en-SG" dirty="0" smtClean="0"/>
+              <a:t>Try out </a:t>
+            </a:r>
+            <a:r>
+              <a:rPr lang="en-SG" dirty="0" err="1" smtClean="0"/>
+              <a:t>spaCy</a:t>
+            </a:r>
+            <a:r>
+              <a:rPr lang="en-SG" dirty="0" smtClean="0"/>
+              <a:t> library to see if it improves the </a:t>
+            </a:r>
+            <a:r>
+              <a:rPr lang="en-US" dirty="0" err="1" smtClean="0"/>
+              <a:t>lemmetization</a:t>
+            </a:r>
+            <a:r>
+              <a:rPr lang="en-SG" smtClean="0"/>
+              <a:t>.</a:t>
+            </a:r>
+            <a:endParaRPr lang="en-SG" dirty="0" smtClean="0"/>
+          </a:p>
+          <a:p>
             <a:endParaRPr lang="en-US" dirty="0"/>
           </a:p>
         </p:txBody>
@@ -6053,11 +6837,7 @@
           <a:p>
             <a:r>
               <a:rPr lang="en-US" sz="2800" dirty="0" smtClean="0"/>
-              <a:t>In turn, help </a:t>
-            </a:r>
-            <a:r>
-              <a:rPr lang="en-US" sz="2800" dirty="0" smtClean="0"/>
-              <a:t>mental health </a:t>
+              <a:t>In turn, help mental health </a:t>
             </a:r>
             <a:r>
               <a:rPr lang="en-US" sz="2800" dirty="0" err="1" smtClean="0"/>
@@ -6073,11 +6853,23 @@
             </a:r>
             <a:r>
               <a:rPr lang="en-US" sz="2800" dirty="0" smtClean="0"/>
-              <a:t> and psychiatrists to have a quick overview if the individual is displaying signs or symptoms of Depression, Anxiety or </a:t>
+              <a:t> and psychiatrists to have a quick overview if the individual is displaying signs </a:t>
             </a:r>
             <a:r>
               <a:rPr lang="en-US" sz="2800" dirty="0" smtClean="0"/>
-              <a:t>both.</a:t>
+              <a:t>/</a:t>
+            </a:r>
+            <a:r>
+              <a:rPr lang="en-US" sz="2800" dirty="0" smtClean="0"/>
+              <a:t> </a:t>
+            </a:r>
+            <a:r>
+              <a:rPr lang="en-US" sz="2800" dirty="0" smtClean="0"/>
+              <a:t>symptoms of </a:t>
+            </a:r>
+            <a:r>
+              <a:rPr lang="en-US" sz="2800" dirty="0" smtClean="0"/>
+              <a:t>Depression or Anxiety.</a:t>
             </a:r>
             <a:endParaRPr lang="en-US" sz="2800" dirty="0" smtClean="0"/>
           </a:p>
@@ -6160,7 +6952,7 @@
         <p:spPr/>
         <p:txBody>
           <a:bodyPr>
-            <a:normAutofit fontScale="92500" lnSpcReduction="20000"/>
+            <a:normAutofit fontScale="85000" lnSpcReduction="10000"/>
           </a:bodyPr>
           <a:lstStyle/>
           <a:p>
@@ -6191,7 +6983,7 @@
           <a:p>
             <a:r>
               <a:rPr lang="en-US" dirty="0" smtClean="0"/>
-              <a:t>Models are built and a final model will be selected.</a:t>
+              <a:t>Models are evaluated based on their generalization to test dataset to select for a final model.</a:t>
             </a:r>
           </a:p>
           <a:p>
@@ -6291,7 +7083,7 @@
           </p:nvPr>
         </p:nvPicPr>
         <p:blipFill>
-          <a:blip r:embed="rId2" cstate="print"/>
+          <a:blip r:embed="rId3" cstate="print"/>
           <a:srcRect/>
           <a:stretch>
             <a:fillRect/>
@@ -6338,7 +7130,7 @@
           <a:p>
             <a:r>
               <a:rPr lang="en-US" dirty="0" smtClean="0">
-                <a:hlinkClick r:id="rId3"/>
+                <a:hlinkClick r:id="rId4"/>
               </a:rPr>
               <a:t>https://www.reddit.com/r/Anxiety/</a:t>
             </a:r>
@@ -6347,7 +7139,7 @@
           <a:p>
             <a:r>
               <a:rPr lang="en-US" dirty="0" smtClean="0">
-                <a:hlinkClick r:id="rId4"/>
+                <a:hlinkClick r:id="rId5"/>
               </a:rPr>
               <a:t>https://www.reddit.com/r/depression/</a:t>
             </a:r>
@@ -6460,15 +7252,7 @@
             </a:pPr>
             <a:r>
               <a:rPr lang="en-US" sz="2400" dirty="0" smtClean="0"/>
-              <a:t>a</a:t>
-            </a:r>
-            <a:r>
-              <a:rPr lang="en-US" sz="2400" dirty="0" smtClean="0"/>
-              <a:t>djectives </a:t>
-            </a:r>
-            <a:r>
-              <a:rPr lang="en-US" sz="2400" dirty="0" smtClean="0"/>
-              <a:t>and adverbs</a:t>
+              <a:t>adjectives and adverbs</a:t>
             </a:r>
             <a:endParaRPr lang="en-US" sz="2400" dirty="0"/>
           </a:p>
@@ -6550,39 +7334,32 @@
         </p:nvSpPr>
         <p:spPr/>
         <p:txBody>
-          <a:bodyPr/>
-          <a:lstStyle/>
-          <a:p>
-            <a:endParaRPr lang="en-US"/>
-          </a:p>
-        </p:txBody>
-      </p:sp>
-      <p:sp>
-        <p:nvSpPr>
-          <p:cNvPr id="3" name="Content Placeholder 2"/>
-          <p:cNvSpPr>
-            <a:spLocks noGrp="1"/>
-          </p:cNvSpPr>
-          <p:nvPr>
-            <p:ph idx="1"/>
-          </p:nvPr>
-        </p:nvSpPr>
-        <p:spPr/>
-        <p:txBody>
-          <a:bodyPr/>
-          <a:lstStyle/>
-          <a:p>
-            <a:endParaRPr lang="en-US"/>
+          <a:bodyPr>
+            <a:normAutofit fontScale="90000"/>
+          </a:bodyPr>
+          <a:lstStyle/>
+          <a:p>
+            <a:r>
+              <a:rPr lang="en-SG" dirty="0" smtClean="0"/>
+              <a:t>Text Data transformed by Count </a:t>
+            </a:r>
+            <a:r>
+              <a:rPr lang="en-SG" dirty="0" err="1" smtClean="0"/>
+              <a:t>Vectorizer</a:t>
+            </a:r>
+            <a:endParaRPr lang="en-US" dirty="0"/>
           </a:p>
         </p:txBody>
       </p:sp>
       <p:pic>
         <p:nvPicPr>
-          <p:cNvPr id="10243" name="Picture 3"/>
+          <p:cNvPr id="1026" name="Picture 2"/>
           <p:cNvPicPr>
-            <a:picLocks noChangeAspect="1" noChangeArrowheads="1"/>
+            <a:picLocks noGrp="1" noChangeAspect="1" noChangeArrowheads="1"/>
           </p:cNvPicPr>
-          <p:nvPr/>
+          <p:nvPr>
+            <p:ph idx="1"/>
+          </p:nvPr>
         </p:nvPicPr>
         <p:blipFill>
           <a:blip r:embed="rId2" cstate="print"/>
@@ -6593,8 +7370,8 @@
         </p:blipFill>
         <p:spPr bwMode="auto">
           <a:xfrm>
-            <a:off x="109538" y="476672"/>
-            <a:ext cx="8924925" cy="6048672"/>
+            <a:off x="1677108" y="3587808"/>
+            <a:ext cx="5847220" cy="2217456"/>
           </a:xfrm>
           <a:prstGeom prst="rect">
             <a:avLst/>
@@ -6608,6 +7385,78 @@
           </a:ln>
         </p:spPr>
       </p:pic>
+      <p:pic>
+        <p:nvPicPr>
+          <p:cNvPr id="1027" name="Picture 3"/>
+          <p:cNvPicPr>
+            <a:picLocks noChangeAspect="1" noChangeArrowheads="1"/>
+          </p:cNvPicPr>
+          <p:nvPr/>
+        </p:nvPicPr>
+        <p:blipFill>
+          <a:blip r:embed="rId3" cstate="print"/>
+          <a:srcRect/>
+          <a:stretch>
+            <a:fillRect/>
+          </a:stretch>
+        </p:blipFill>
+        <p:spPr bwMode="auto">
+          <a:xfrm>
+            <a:off x="971600" y="1484784"/>
+            <a:ext cx="7515225" cy="885825"/>
+          </a:xfrm>
+          <a:prstGeom prst="rect">
+            <a:avLst/>
+          </a:prstGeom>
+          <a:noFill/>
+          <a:ln w="9525">
+            <a:noFill/>
+            <a:miter lim="800000"/>
+            <a:headEnd/>
+            <a:tailEnd/>
+          </a:ln>
+        </p:spPr>
+      </p:pic>
+      <p:sp>
+        <p:nvSpPr>
+          <p:cNvPr id="6" name="Down Arrow 5"/>
+          <p:cNvSpPr/>
+          <p:nvPr/>
+        </p:nvSpPr>
+        <p:spPr>
+          <a:xfrm>
+            <a:off x="4283968" y="2492896"/>
+            <a:ext cx="360040" cy="936104"/>
+          </a:xfrm>
+          <a:prstGeom prst="downArrow">
+            <a:avLst/>
+          </a:prstGeom>
+        </p:spPr>
+        <p:style>
+          <a:lnRef idx="2">
+            <a:schemeClr val="accent1">
+              <a:shade val="50000"/>
+            </a:schemeClr>
+          </a:lnRef>
+          <a:fillRef idx="1">
+            <a:schemeClr val="accent1"/>
+          </a:fillRef>
+          <a:effectRef idx="0">
+            <a:schemeClr val="accent1"/>
+          </a:effectRef>
+          <a:fontRef idx="minor">
+            <a:schemeClr val="lt1"/>
+          </a:fontRef>
+        </p:style>
+        <p:txBody>
+          <a:bodyPr rtlCol="0" anchor="ctr"/>
+          <a:lstStyle/>
+          <a:p>
+            <a:pPr algn="ctr"/>
+            <a:endParaRPr lang="en-US"/>
+          </a:p>
+        </p:txBody>
+      </p:sp>
     </p:spTree>
   </p:cSld>
   <p:clrMapOvr>
@@ -6650,58 +7499,37 @@
             <p:ph type="title"/>
           </p:nvPr>
         </p:nvSpPr>
-        <p:spPr/>
-        <p:txBody>
-          <a:bodyPr/>
-          <a:lstStyle/>
-          <a:p>
-            <a:endParaRPr lang="en-US"/>
-          </a:p>
-        </p:txBody>
-      </p:sp>
-      <p:sp>
-        <p:nvSpPr>
-          <p:cNvPr id="3" name="Content Placeholder 2"/>
-          <p:cNvSpPr>
-            <a:spLocks noGrp="1"/>
-          </p:cNvSpPr>
-          <p:nvPr>
-            <p:ph idx="1"/>
-          </p:nvPr>
-        </p:nvSpPr>
         <p:spPr>
           <a:xfrm>
-            <a:off x="4067944" y="1628800"/>
-            <a:ext cx="3106688" cy="3993307"/>
+            <a:off x="97160" y="116632"/>
+            <a:ext cx="8867328" cy="1224136"/>
           </a:xfrm>
         </p:spPr>
         <p:txBody>
-          <a:bodyPr/>
-          <a:lstStyle/>
-          <a:p>
-            <a:r>
-              <a:rPr lang="en-SG" dirty="0" smtClean="0"/>
-              <a:t>List of common words between Depression and Anxiety after </a:t>
-            </a:r>
-            <a:r>
-              <a:rPr lang="en-SG" dirty="0" err="1" smtClean="0"/>
-              <a:t>nb_cvec</a:t>
-            </a:r>
-            <a:r>
-              <a:rPr lang="en-SG" dirty="0" smtClean="0"/>
-              <a:t> </a:t>
-            </a:r>
-            <a:r>
-              <a:rPr lang="en-SG" dirty="0" err="1" smtClean="0"/>
-              <a:t>modeling</a:t>
-            </a:r>
-            <a:endParaRPr lang="en-US" dirty="0"/>
+          <a:bodyPr>
+            <a:noAutofit/>
+          </a:bodyPr>
+          <a:lstStyle/>
+          <a:p>
+            <a:r>
+              <a:rPr lang="en-SG" sz="3200" dirty="0" smtClean="0"/>
+              <a:t>Text data transformed by Term </a:t>
+            </a:r>
+            <a:r>
+              <a:rPr lang="en-SG" sz="3200" dirty="0" smtClean="0"/>
+              <a:t>Frequency Inverse Document Frequency (TF-IDF) </a:t>
+            </a:r>
+            <a:r>
+              <a:rPr lang="en-SG" sz="3200" dirty="0" err="1" smtClean="0"/>
+              <a:t>Vectorizer</a:t>
+            </a:r>
+            <a:endParaRPr lang="en-US" sz="3200" dirty="0"/>
           </a:p>
         </p:txBody>
       </p:sp>
       <p:pic>
         <p:nvPicPr>
-          <p:cNvPr id="1026" name="Picture 2"/>
+          <p:cNvPr id="1027" name="Picture 3"/>
           <p:cNvPicPr>
             <a:picLocks noChangeAspect="1" noChangeArrowheads="1"/>
           </p:cNvPicPr>
@@ -6709,15 +7537,120 @@
         </p:nvPicPr>
         <p:blipFill>
           <a:blip r:embed="rId2" cstate="print"/>
-          <a:srcRect l="19747" r="49326"/>
+          <a:srcRect/>
           <a:stretch>
             <a:fillRect/>
           </a:stretch>
         </p:blipFill>
         <p:spPr bwMode="auto">
           <a:xfrm>
-            <a:off x="1691680" y="-6524"/>
-            <a:ext cx="1800200" cy="6819900"/>
+            <a:off x="827584" y="1484784"/>
+            <a:ext cx="7515225" cy="885825"/>
+          </a:xfrm>
+          <a:prstGeom prst="rect">
+            <a:avLst/>
+          </a:prstGeom>
+          <a:noFill/>
+          <a:ln w="9525">
+            <a:noFill/>
+            <a:miter lim="800000"/>
+            <a:headEnd/>
+            <a:tailEnd/>
+          </a:ln>
+        </p:spPr>
+      </p:pic>
+      <p:sp>
+        <p:nvSpPr>
+          <p:cNvPr id="6" name="Down Arrow 5"/>
+          <p:cNvSpPr/>
+          <p:nvPr/>
+        </p:nvSpPr>
+        <p:spPr>
+          <a:xfrm>
+            <a:off x="4283968" y="2492896"/>
+            <a:ext cx="360040" cy="576064"/>
+          </a:xfrm>
+          <a:prstGeom prst="downArrow">
+            <a:avLst/>
+          </a:prstGeom>
+        </p:spPr>
+        <p:style>
+          <a:lnRef idx="2">
+            <a:schemeClr val="accent1">
+              <a:shade val="50000"/>
+            </a:schemeClr>
+          </a:lnRef>
+          <a:fillRef idx="1">
+            <a:schemeClr val="accent1"/>
+          </a:fillRef>
+          <a:effectRef idx="0">
+            <a:schemeClr val="accent1"/>
+          </a:effectRef>
+          <a:fontRef idx="minor">
+            <a:schemeClr val="lt1"/>
+          </a:fontRef>
+        </p:style>
+        <p:txBody>
+          <a:bodyPr rtlCol="0" anchor="ctr"/>
+          <a:lstStyle/>
+          <a:p>
+            <a:pPr algn="ctr"/>
+            <a:endParaRPr lang="en-US"/>
+          </a:p>
+        </p:txBody>
+      </p:sp>
+      <p:sp>
+        <p:nvSpPr>
+          <p:cNvPr id="7" name="Content Placeholder 6"/>
+          <p:cNvSpPr>
+            <a:spLocks noGrp="1"/>
+          </p:cNvSpPr>
+          <p:nvPr>
+            <p:ph idx="1"/>
+          </p:nvPr>
+        </p:nvSpPr>
+        <p:spPr>
+          <a:xfrm>
+            <a:off x="0" y="6581725"/>
+            <a:ext cx="6696744" cy="276275"/>
+          </a:xfrm>
+        </p:spPr>
+        <p:txBody>
+          <a:bodyPr>
+            <a:normAutofit fontScale="92500"/>
+          </a:bodyPr>
+          <a:lstStyle/>
+          <a:p>
+            <a:pPr>
+              <a:buNone/>
+            </a:pPr>
+            <a:r>
+              <a:rPr lang="en-US" sz="1200" dirty="0" smtClean="0"/>
+              <a:t>https://www.freecodecamp.org/news/how-to-process-textual-data-using-tf-idf-in-python-cd2bbc0a94a3/</a:t>
+            </a:r>
+            <a:endParaRPr lang="en-US" sz="1200" dirty="0"/>
+          </a:p>
+        </p:txBody>
+      </p:sp>
+      <p:pic>
+        <p:nvPicPr>
+          <p:cNvPr id="2050" name="Picture 2"/>
+          <p:cNvPicPr>
+            <a:picLocks noChangeAspect="1" noChangeArrowheads="1"/>
+          </p:cNvPicPr>
+          <p:nvPr/>
+        </p:nvPicPr>
+        <p:blipFill>
+          <a:blip r:embed="rId3" cstate="print"/>
+          <a:srcRect/>
+          <a:stretch>
+            <a:fillRect/>
+          </a:stretch>
+        </p:blipFill>
+        <p:spPr bwMode="auto">
+          <a:xfrm>
+            <a:off x="467544" y="3284984"/>
+            <a:ext cx="8280920" cy="3096344"/>
           </a:xfrm>
           <a:prstGeom prst="rect">
             <a:avLst/>

</xml_diff>